<commit_message>
Adjustements in the presentation
</commit_message>
<xml_diff>
--- a/mhw1.pptx
+++ b/mhw1.pptx
@@ -11,11 +11,12 @@
     <p:sldId id="265" r:id="rId5"/>
     <p:sldId id="266" r:id="rId6"/>
     <p:sldId id="260" r:id="rId7"/>
-    <p:sldId id="262" r:id="rId8"/>
-    <p:sldId id="267" r:id="rId9"/>
-    <p:sldId id="268" r:id="rId10"/>
-    <p:sldId id="264" r:id="rId11"/>
-    <p:sldId id="269" r:id="rId12"/>
+    <p:sldId id="270" r:id="rId8"/>
+    <p:sldId id="262" r:id="rId9"/>
+    <p:sldId id="267" r:id="rId10"/>
+    <p:sldId id="268" r:id="rId11"/>
+    <p:sldId id="264" r:id="rId12"/>
+    <p:sldId id="269" r:id="rId13"/>
   </p:sldIdLst>
   <p:sldSz cx="12192000" cy="6858000"/>
   <p:notesSz cx="6858000" cy="9144000"/>
@@ -5238,17 +5239,17 @@
                   <a:srgbClr val="FFFFFF"/>
                 </a:solidFill>
               </a:rPr>
-              <a:t>Footer</a:t>
+              <a:t>Sezione contenuti</a:t>
             </a:r>
           </a:p>
         </p:txBody>
       </p:sp>
       <p:pic>
         <p:nvPicPr>
-          <p:cNvPr id="7" name="Immagine 6">
-            <a:extLst>
-              <a:ext uri="{FF2B5EF4-FFF2-40B4-BE49-F238E27FC236}">
-                <a16:creationId xmlns:a16="http://schemas.microsoft.com/office/drawing/2014/main" id="{068C6B5A-3BC0-4FDC-99B8-CE4FA734F93C}"/>
+          <p:cNvPr id="11" name="Immagine 10" descr="Immagine che contiene testo&#10;&#10;Descrizione generata automaticamente">
+            <a:extLst>
+              <a:ext uri="{FF2B5EF4-FFF2-40B4-BE49-F238E27FC236}">
+                <a16:creationId xmlns:a16="http://schemas.microsoft.com/office/drawing/2014/main" id="{A34E79B4-725F-4F45-949F-B67BE02CA9C8}"/>
               </a:ext>
             </a:extLst>
           </p:cNvPr>
@@ -5271,8 +5272,8 @@
         </p:blipFill>
         <p:spPr>
           <a:xfrm>
-            <a:off x="4192446" y="134590"/>
-            <a:ext cx="7923443" cy="452265"/>
+            <a:off x="4134810" y="305953"/>
+            <a:ext cx="4673592" cy="3949300"/>
           </a:xfrm>
           <a:prstGeom prst="rect">
             <a:avLst/>
@@ -5281,10 +5282,10 @@
       </p:pic>
       <p:pic>
         <p:nvPicPr>
-          <p:cNvPr id="11" name="Immagine 10" descr="Immagine che contiene testo, monitor, screenshot, schermo&#10;&#10;Descrizione generata automaticamente">
-            <a:extLst>
-              <a:ext uri="{FF2B5EF4-FFF2-40B4-BE49-F238E27FC236}">
-                <a16:creationId xmlns:a16="http://schemas.microsoft.com/office/drawing/2014/main" id="{98BD67F2-FD97-45FB-98A5-1389950EF394}"/>
+          <p:cNvPr id="5" name="Immagine 4" descr="Immagine che contiene testo&#10;&#10;Descrizione generata automaticamente">
+            <a:extLst>
+              <a:ext uri="{FF2B5EF4-FFF2-40B4-BE49-F238E27FC236}">
+                <a16:creationId xmlns:a16="http://schemas.microsoft.com/office/drawing/2014/main" id="{05138AD6-BED4-409D-AD7F-7676AB2A0AF2}"/>
               </a:ext>
             </a:extLst>
           </p:cNvPr>
@@ -5307,8 +5308,8 @@
         </p:blipFill>
         <p:spPr>
           <a:xfrm>
-            <a:off x="5255486" y="940689"/>
-            <a:ext cx="5715798" cy="3077004"/>
+            <a:off x="8808402" y="305953"/>
+            <a:ext cx="3412208" cy="5630613"/>
           </a:xfrm>
           <a:prstGeom prst="rect">
             <a:avLst/>
@@ -5317,10 +5318,10 @@
       </p:pic>
       <p:pic>
         <p:nvPicPr>
-          <p:cNvPr id="19" name="Immagine 18" descr="Immagine che contiene testo&#10;&#10;Descrizione generata automaticamente">
-            <a:extLst>
-              <a:ext uri="{FF2B5EF4-FFF2-40B4-BE49-F238E27FC236}">
-                <a16:creationId xmlns:a16="http://schemas.microsoft.com/office/drawing/2014/main" id="{DC161B03-E4B7-4117-A1BE-F2E425698059}"/>
+          <p:cNvPr id="15" name="Immagine 14" descr="Immagine che contiene testo&#10;&#10;Descrizione generata automaticamente">
+            <a:extLst>
+              <a:ext uri="{FF2B5EF4-FFF2-40B4-BE49-F238E27FC236}">
+                <a16:creationId xmlns:a16="http://schemas.microsoft.com/office/drawing/2014/main" id="{457E9F87-0801-4543-9544-C18F158F90B2}"/>
               </a:ext>
             </a:extLst>
           </p:cNvPr>
@@ -5343,8 +5344,8 @@
         </p:blipFill>
         <p:spPr>
           <a:xfrm>
-            <a:off x="6793988" y="4484583"/>
-            <a:ext cx="2638793" cy="2019582"/>
+            <a:off x="4566211" y="4265395"/>
+            <a:ext cx="4145207" cy="2504143"/>
           </a:xfrm>
           <a:prstGeom prst="rect">
             <a:avLst/>
@@ -5354,7 +5355,7 @@
     </p:spTree>
     <p:extLst>
       <p:ext uri="{BB962C8B-B14F-4D97-AF65-F5344CB8AC3E}">
-        <p14:creationId xmlns:p14="http://schemas.microsoft.com/office/powerpoint/2010/main" val="1983895457"/>
+        <p14:creationId xmlns:p14="http://schemas.microsoft.com/office/powerpoint/2010/main" val="90384242"/>
       </p:ext>
     </p:extLst>
   </p:cSld>
@@ -6256,10 +6257,10 @@
       </p:sp>
       <p:pic>
         <p:nvPicPr>
-          <p:cNvPr id="13" name="Immagine 12" descr="Immagine che contiene testo&#10;&#10;Descrizione generata automaticamente">
-            <a:extLst>
-              <a:ext uri="{FF2B5EF4-FFF2-40B4-BE49-F238E27FC236}">
-                <a16:creationId xmlns:a16="http://schemas.microsoft.com/office/drawing/2014/main" id="{DBE7CF23-9672-45DD-8284-2E121CE82C65}"/>
+          <p:cNvPr id="7" name="Immagine 6">
+            <a:extLst>
+              <a:ext uri="{FF2B5EF4-FFF2-40B4-BE49-F238E27FC236}">
+                <a16:creationId xmlns:a16="http://schemas.microsoft.com/office/drawing/2014/main" id="{068C6B5A-3BC0-4FDC-99B8-CE4FA734F93C}"/>
               </a:ext>
             </a:extLst>
           </p:cNvPr>
@@ -6282,8 +6283,80 @@
         </p:blipFill>
         <p:spPr>
           <a:xfrm>
-            <a:off x="6433266" y="575250"/>
-            <a:ext cx="3086531" cy="5687219"/>
+            <a:off x="4192446" y="134590"/>
+            <a:ext cx="7923443" cy="452265"/>
+          </a:xfrm>
+          <a:prstGeom prst="rect">
+            <a:avLst/>
+          </a:prstGeom>
+        </p:spPr>
+      </p:pic>
+      <p:pic>
+        <p:nvPicPr>
+          <p:cNvPr id="11" name="Immagine 10" descr="Immagine che contiene testo, monitor, screenshot, schermo&#10;&#10;Descrizione generata automaticamente">
+            <a:extLst>
+              <a:ext uri="{FF2B5EF4-FFF2-40B4-BE49-F238E27FC236}">
+                <a16:creationId xmlns:a16="http://schemas.microsoft.com/office/drawing/2014/main" id="{98BD67F2-FD97-45FB-98A5-1389950EF394}"/>
+              </a:ext>
+            </a:extLst>
+          </p:cNvPr>
+          <p:cNvPicPr>
+            <a:picLocks noChangeAspect="1"/>
+          </p:cNvPicPr>
+          <p:nvPr/>
+        </p:nvPicPr>
+        <p:blipFill>
+          <a:blip r:embed="rId3">
+            <a:extLst>
+              <a:ext uri="{28A0092B-C50C-407E-A947-70E740481C1C}">
+                <a14:useLocalDpi xmlns:a14="http://schemas.microsoft.com/office/drawing/2010/main" val="0"/>
+              </a:ext>
+            </a:extLst>
+          </a:blip>
+          <a:stretch>
+            <a:fillRect/>
+          </a:stretch>
+        </p:blipFill>
+        <p:spPr>
+          <a:xfrm>
+            <a:off x="5255486" y="940689"/>
+            <a:ext cx="5715798" cy="3077004"/>
+          </a:xfrm>
+          <a:prstGeom prst="rect">
+            <a:avLst/>
+          </a:prstGeom>
+        </p:spPr>
+      </p:pic>
+      <p:pic>
+        <p:nvPicPr>
+          <p:cNvPr id="19" name="Immagine 18" descr="Immagine che contiene testo&#10;&#10;Descrizione generata automaticamente">
+            <a:extLst>
+              <a:ext uri="{FF2B5EF4-FFF2-40B4-BE49-F238E27FC236}">
+                <a16:creationId xmlns:a16="http://schemas.microsoft.com/office/drawing/2014/main" id="{DC161B03-E4B7-4117-A1BE-F2E425698059}"/>
+              </a:ext>
+            </a:extLst>
+          </p:cNvPr>
+          <p:cNvPicPr>
+            <a:picLocks noChangeAspect="1"/>
+          </p:cNvPicPr>
+          <p:nvPr/>
+        </p:nvPicPr>
+        <p:blipFill>
+          <a:blip r:embed="rId4">
+            <a:extLst>
+              <a:ext uri="{28A0092B-C50C-407E-A947-70E740481C1C}">
+                <a14:useLocalDpi xmlns:a14="http://schemas.microsoft.com/office/drawing/2010/main" val="0"/>
+              </a:ext>
+            </a:extLst>
+          </a:blip>
+          <a:stretch>
+            <a:fillRect/>
+          </a:stretch>
+        </p:blipFill>
+        <p:spPr>
+          <a:xfrm>
+            <a:off x="6793988" y="4484583"/>
+            <a:ext cx="2638793" cy="2019582"/>
           </a:xfrm>
           <a:prstGeom prst="rect">
             <a:avLst/>
@@ -6293,7 +6366,7 @@
     </p:spTree>
     <p:extLst>
       <p:ext uri="{BB962C8B-B14F-4D97-AF65-F5344CB8AC3E}">
-        <p14:creationId xmlns:p14="http://schemas.microsoft.com/office/powerpoint/2010/main" val="1796906992"/>
+        <p14:creationId xmlns:p14="http://schemas.microsoft.com/office/powerpoint/2010/main" val="1983895457"/>
       </p:ext>
     </p:extLst>
   </p:cSld>
@@ -6303,7 +6376,7 @@
 </p:sld>
 </file>
 
-<file path=ppt/slides/slide2.xml><?xml version="1.0" encoding="utf-8"?>
+<file path=ppt/slides/slide12.xml><?xml version="1.0" encoding="utf-8"?>
 <p:sld xmlns:a="http://schemas.openxmlformats.org/drawingml/2006/main" xmlns:r="http://schemas.openxmlformats.org/officeDocument/2006/relationships" xmlns:p="http://schemas.openxmlformats.org/presentationml/2006/main">
   <p:cSld>
     <p:bg>
@@ -6399,8 +6472,37 @@
           <a:bodyPr rtlCol="0" anchor="ctr"/>
           <a:lstStyle/>
           <a:p>
-            <a:pPr algn="ctr"/>
-            <a:endParaRPr lang="en-US"/>
+            <a:pPr marL="0" marR="0" lvl="0" indent="0" algn="ctr" defTabSz="914400" rtl="0" eaLnBrk="1" fontAlgn="auto" latinLnBrk="0" hangingPunct="1">
+              <a:lnSpc>
+                <a:spcPct val="100000"/>
+              </a:lnSpc>
+              <a:spcBef>
+                <a:spcPts val="0"/>
+              </a:spcBef>
+              <a:spcAft>
+                <a:spcPts val="0"/>
+              </a:spcAft>
+              <a:buClrTx/>
+              <a:buSzTx/>
+              <a:buFontTx/>
+              <a:buNone/>
+              <a:tabLst/>
+              <a:defRPr/>
+            </a:pPr>
+            <a:endParaRPr kumimoji="0" lang="en-US" sz="1800" b="0" i="0" u="none" strike="noStrike" kern="1200" cap="none" spc="0" normalizeH="0" baseline="0" noProof="0">
+              <a:ln>
+                <a:noFill/>
+              </a:ln>
+              <a:solidFill>
+                <a:prstClr val="white"/>
+              </a:solidFill>
+              <a:effectLst/>
+              <a:uLnTx/>
+              <a:uFillTx/>
+              <a:latin typeface="Calibri" panose="020F0502020204030204"/>
+              <a:ea typeface="+mn-ea"/>
+              <a:cs typeface="+mn-cs"/>
+            </a:endParaRPr>
           </a:p>
         </p:txBody>
       </p:sp>
@@ -6475,8 +6577,37 @@
           <a:bodyPr rtlCol="0" anchor="ctr"/>
           <a:lstStyle/>
           <a:p>
-            <a:pPr algn="ctr"/>
-            <a:endParaRPr lang="en-US"/>
+            <a:pPr marL="0" marR="0" lvl="0" indent="0" algn="ctr" defTabSz="914400" rtl="0" eaLnBrk="1" fontAlgn="auto" latinLnBrk="0" hangingPunct="1">
+              <a:lnSpc>
+                <a:spcPct val="100000"/>
+              </a:lnSpc>
+              <a:spcBef>
+                <a:spcPts val="0"/>
+              </a:spcBef>
+              <a:spcAft>
+                <a:spcPts val="0"/>
+              </a:spcAft>
+              <a:buClrTx/>
+              <a:buSzTx/>
+              <a:buFontTx/>
+              <a:buNone/>
+              <a:tabLst/>
+              <a:defRPr/>
+            </a:pPr>
+            <a:endParaRPr kumimoji="0" lang="en-US" sz="1800" b="0" i="0" u="none" strike="noStrike" kern="1200" cap="none" spc="0" normalizeH="0" baseline="0" noProof="0">
+              <a:ln>
+                <a:noFill/>
+              </a:ln>
+              <a:solidFill>
+                <a:prstClr val="white"/>
+              </a:solidFill>
+              <a:effectLst/>
+              <a:uLnTx/>
+              <a:uFillTx/>
+              <a:latin typeface="Calibri" panose="020F0502020204030204"/>
+              <a:ea typeface="+mn-ea"/>
+              <a:cs typeface="+mn-cs"/>
+            </a:endParaRPr>
           </a:p>
         </p:txBody>
       </p:sp>
@@ -6548,8 +6679,37 @@
           <a:bodyPr rtlCol="0" anchor="ctr"/>
           <a:lstStyle/>
           <a:p>
-            <a:pPr algn="ctr"/>
-            <a:endParaRPr lang="en-US"/>
+            <a:pPr marL="0" marR="0" lvl="0" indent="0" algn="ctr" defTabSz="914400" rtl="0" eaLnBrk="1" fontAlgn="auto" latinLnBrk="0" hangingPunct="1">
+              <a:lnSpc>
+                <a:spcPct val="100000"/>
+              </a:lnSpc>
+              <a:spcBef>
+                <a:spcPts val="0"/>
+              </a:spcBef>
+              <a:spcAft>
+                <a:spcPts val="0"/>
+              </a:spcAft>
+              <a:buClrTx/>
+              <a:buSzTx/>
+              <a:buFontTx/>
+              <a:buNone/>
+              <a:tabLst/>
+              <a:defRPr/>
+            </a:pPr>
+            <a:endParaRPr kumimoji="0" lang="en-US" sz="1800" b="0" i="0" u="none" strike="noStrike" kern="1200" cap="none" spc="0" normalizeH="0" baseline="0" noProof="0">
+              <a:ln>
+                <a:noFill/>
+              </a:ln>
+              <a:solidFill>
+                <a:prstClr val="white"/>
+              </a:solidFill>
+              <a:effectLst/>
+              <a:uLnTx/>
+              <a:uFillTx/>
+              <a:latin typeface="Calibri" panose="020F0502020204030204"/>
+              <a:ea typeface="+mn-ea"/>
+              <a:cs typeface="+mn-cs"/>
+            </a:endParaRPr>
           </a:p>
         </p:txBody>
       </p:sp>
@@ -6623,8 +6783,37 @@
           <a:bodyPr rtlCol="0" anchor="ctr"/>
           <a:lstStyle/>
           <a:p>
-            <a:pPr algn="ctr"/>
-            <a:endParaRPr lang="en-US"/>
+            <a:pPr marL="0" marR="0" lvl="0" indent="0" algn="ctr" defTabSz="914400" rtl="0" eaLnBrk="1" fontAlgn="auto" latinLnBrk="0" hangingPunct="1">
+              <a:lnSpc>
+                <a:spcPct val="100000"/>
+              </a:lnSpc>
+              <a:spcBef>
+                <a:spcPts val="0"/>
+              </a:spcBef>
+              <a:spcAft>
+                <a:spcPts val="0"/>
+              </a:spcAft>
+              <a:buClrTx/>
+              <a:buSzTx/>
+              <a:buFontTx/>
+              <a:buNone/>
+              <a:tabLst/>
+              <a:defRPr/>
+            </a:pPr>
+            <a:endParaRPr kumimoji="0" lang="en-US" sz="1800" b="0" i="0" u="none" strike="noStrike" kern="1200" cap="none" spc="0" normalizeH="0" baseline="0" noProof="0">
+              <a:ln>
+                <a:noFill/>
+              </a:ln>
+              <a:solidFill>
+                <a:prstClr val="white"/>
+              </a:solidFill>
+              <a:effectLst/>
+              <a:uLnTx/>
+              <a:uFillTx/>
+              <a:latin typeface="Calibri" panose="020F0502020204030204"/>
+              <a:ea typeface="+mn-ea"/>
+              <a:cs typeface="+mn-cs"/>
+            </a:endParaRPr>
           </a:p>
         </p:txBody>
       </p:sp>
@@ -6698,8 +6887,37 @@
           <a:bodyPr rtlCol="0" anchor="ctr"/>
           <a:lstStyle/>
           <a:p>
-            <a:pPr algn="ctr"/>
-            <a:endParaRPr lang="en-US" dirty="0"/>
+            <a:pPr marL="0" marR="0" lvl="0" indent="0" algn="ctr" defTabSz="914400" rtl="0" eaLnBrk="1" fontAlgn="auto" latinLnBrk="0" hangingPunct="1">
+              <a:lnSpc>
+                <a:spcPct val="100000"/>
+              </a:lnSpc>
+              <a:spcBef>
+                <a:spcPts val="0"/>
+              </a:spcBef>
+              <a:spcAft>
+                <a:spcPts val="0"/>
+              </a:spcAft>
+              <a:buClrTx/>
+              <a:buSzTx/>
+              <a:buFontTx/>
+              <a:buNone/>
+              <a:tabLst/>
+              <a:defRPr/>
+            </a:pPr>
+            <a:endParaRPr kumimoji="0" lang="en-US" sz="1800" b="0" i="0" u="none" strike="noStrike" kern="1200" cap="none" spc="0" normalizeH="0" baseline="0" noProof="0" dirty="0">
+              <a:ln>
+                <a:noFill/>
+              </a:ln>
+              <a:solidFill>
+                <a:prstClr val="white"/>
+              </a:solidFill>
+              <a:effectLst/>
+              <a:uLnTx/>
+              <a:uFillTx/>
+              <a:latin typeface="Calibri" panose="020F0502020204030204"/>
+              <a:ea typeface="+mn-ea"/>
+              <a:cs typeface="+mn-cs"/>
+            </a:endParaRPr>
           </a:p>
         </p:txBody>
       </p:sp>
@@ -6868,8 +7086,37 @@
           </a:bodyPr>
           <a:lstStyle/>
           <a:p>
-            <a:pPr algn="ctr"/>
-            <a:endParaRPr lang="en-US" dirty="0"/>
+            <a:pPr marL="0" marR="0" lvl="0" indent="0" algn="ctr" defTabSz="914400" rtl="0" eaLnBrk="1" fontAlgn="auto" latinLnBrk="0" hangingPunct="1">
+              <a:lnSpc>
+                <a:spcPct val="100000"/>
+              </a:lnSpc>
+              <a:spcBef>
+                <a:spcPts val="0"/>
+              </a:spcBef>
+              <a:spcAft>
+                <a:spcPts val="0"/>
+              </a:spcAft>
+              <a:buClrTx/>
+              <a:buSzTx/>
+              <a:buFontTx/>
+              <a:buNone/>
+              <a:tabLst/>
+              <a:defRPr/>
+            </a:pPr>
+            <a:endParaRPr kumimoji="0" lang="en-US" sz="1800" b="0" i="0" u="none" strike="noStrike" kern="1200" cap="none" spc="0" normalizeH="0" baseline="0" noProof="0" dirty="0">
+              <a:ln>
+                <a:noFill/>
+              </a:ln>
+              <a:solidFill>
+                <a:prstClr val="white"/>
+              </a:solidFill>
+              <a:effectLst/>
+              <a:uLnTx/>
+              <a:uFillTx/>
+              <a:latin typeface="Calibri" panose="020F0502020204030204"/>
+              <a:ea typeface="+mn-ea"/>
+              <a:cs typeface="+mn-cs"/>
+            </a:endParaRPr>
           </a:p>
         </p:txBody>
       </p:sp>
@@ -6945,8 +7192,37 @@
           <a:bodyPr rtlCol="0" anchor="ctr"/>
           <a:lstStyle/>
           <a:p>
-            <a:pPr algn="ctr"/>
-            <a:endParaRPr lang="en-US"/>
+            <a:pPr marL="0" marR="0" lvl="0" indent="0" algn="ctr" defTabSz="914400" rtl="0" eaLnBrk="1" fontAlgn="auto" latinLnBrk="0" hangingPunct="1">
+              <a:lnSpc>
+                <a:spcPct val="100000"/>
+              </a:lnSpc>
+              <a:spcBef>
+                <a:spcPts val="0"/>
+              </a:spcBef>
+              <a:spcAft>
+                <a:spcPts val="0"/>
+              </a:spcAft>
+              <a:buClrTx/>
+              <a:buSzTx/>
+              <a:buFontTx/>
+              <a:buNone/>
+              <a:tabLst/>
+              <a:defRPr/>
+            </a:pPr>
+            <a:endParaRPr kumimoji="0" lang="en-US" sz="1800" b="0" i="0" u="none" strike="noStrike" kern="1200" cap="none" spc="0" normalizeH="0" baseline="0" noProof="0">
+              <a:ln>
+                <a:noFill/>
+              </a:ln>
+              <a:solidFill>
+                <a:prstClr val="white"/>
+              </a:solidFill>
+              <a:effectLst/>
+              <a:uLnTx/>
+              <a:uFillTx/>
+              <a:latin typeface="Calibri" panose="020F0502020204030204"/>
+              <a:ea typeface="+mn-ea"/>
+              <a:cs typeface="+mn-cs"/>
+            </a:endParaRPr>
           </a:p>
         </p:txBody>
       </p:sp>
@@ -6955,7 +7231,7 @@
           <p:cNvPr id="2" name="Title 1">
             <a:extLst>
               <a:ext uri="{FF2B5EF4-FFF2-40B4-BE49-F238E27FC236}">
-                <a16:creationId xmlns:a16="http://schemas.microsoft.com/office/drawing/2014/main" id="{5D199468-442B-44D8-8FB1-9E9E01386302}"/>
+                <a16:creationId xmlns:a16="http://schemas.microsoft.com/office/drawing/2014/main" id="{E9FFD19F-75CA-4966-B79C-2935A271ADBD}"/>
               </a:ext>
             </a:extLst>
           </p:cNvPr>
@@ -6980,67 +7256,56 @@
           <a:p>
             <a:pPr algn="r"/>
             <a:r>
-              <a:rPr lang="it-IT" sz="4000">
+              <a:rPr lang="it-IT" sz="4000" dirty="0">
                 <a:solidFill>
                   <a:srgbClr val="FFFFFF"/>
                 </a:solidFill>
               </a:rPr>
-              <a:t>Descrizione del progetto</a:t>
+              <a:t>Footer</a:t>
             </a:r>
           </a:p>
         </p:txBody>
       </p:sp>
-      <p:sp>
-        <p:nvSpPr>
-          <p:cNvPr id="3" name="Content Placeholder 2">
-            <a:extLst>
-              <a:ext uri="{FF2B5EF4-FFF2-40B4-BE49-F238E27FC236}">
-                <a16:creationId xmlns:a16="http://schemas.microsoft.com/office/drawing/2014/main" id="{A05D1882-65DE-484D-B983-8F24ECBDF31D}"/>
-              </a:ext>
-            </a:extLst>
-          </p:cNvPr>
-          <p:cNvSpPr>
-            <a:spLocks noGrp="1"/>
-          </p:cNvSpPr>
-          <p:nvPr>
-            <p:ph idx="1"/>
-          </p:nvPr>
-        </p:nvSpPr>
+      <p:pic>
+        <p:nvPicPr>
+          <p:cNvPr id="13" name="Immagine 12" descr="Immagine che contiene testo&#10;&#10;Descrizione generata automaticamente">
+            <a:extLst>
+              <a:ext uri="{FF2B5EF4-FFF2-40B4-BE49-F238E27FC236}">
+                <a16:creationId xmlns:a16="http://schemas.microsoft.com/office/drawing/2014/main" id="{DBE7CF23-9672-45DD-8284-2E121CE82C65}"/>
+              </a:ext>
+            </a:extLst>
+          </p:cNvPr>
+          <p:cNvPicPr>
+            <a:picLocks noChangeAspect="1"/>
+          </p:cNvPicPr>
+          <p:nvPr/>
+        </p:nvPicPr>
+        <p:blipFill>
+          <a:blip r:embed="rId2">
+            <a:extLst>
+              <a:ext uri="{28A0092B-C50C-407E-A947-70E740481C1C}">
+                <a14:useLocalDpi xmlns:a14="http://schemas.microsoft.com/office/drawing/2010/main" val="0"/>
+              </a:ext>
+            </a:extLst>
+          </a:blip>
+          <a:stretch>
+            <a:fillRect/>
+          </a:stretch>
+        </p:blipFill>
         <p:spPr>
           <a:xfrm>
-            <a:off x="4810259" y="649480"/>
-            <a:ext cx="6555347" cy="5546047"/>
+            <a:off x="6433266" y="575250"/>
+            <a:ext cx="3086531" cy="5687219"/>
           </a:xfrm>
+          <a:prstGeom prst="rect">
+            <a:avLst/>
+          </a:prstGeom>
         </p:spPr>
-        <p:txBody>
-          <a:bodyPr anchor="ctr">
-            <a:normAutofit/>
-          </a:bodyPr>
-          <a:lstStyle/>
-          <a:p>
-            <a:r>
-              <a:rPr lang="it-IT" sz="2000" dirty="0"/>
-              <a:t>Il progetto riguarda la gestione informatica di una catena di supermercati</a:t>
-            </a:r>
-          </a:p>
-          <a:p>
-            <a:pPr lvl="1"/>
-            <a:r>
-              <a:rPr lang="it-IT" sz="2000" dirty="0"/>
-              <a:t>L’applicazione web presenterà una home page principale per tutti gli utenti e delle sezioni private per la gestione e la consultazione dei dati del </a:t>
-            </a:r>
-            <a:r>
-              <a:rPr lang="it-IT" sz="2000" dirty="0" err="1"/>
-              <a:t>databse</a:t>
-            </a:r>
-            <a:endParaRPr lang="it-IT" sz="2000" dirty="0"/>
-          </a:p>
-        </p:txBody>
-      </p:sp>
+      </p:pic>
     </p:spTree>
     <p:extLst>
       <p:ext uri="{BB962C8B-B14F-4D97-AF65-F5344CB8AC3E}">
-        <p14:creationId xmlns:p14="http://schemas.microsoft.com/office/powerpoint/2010/main" val="2693910554"/>
+        <p14:creationId xmlns:p14="http://schemas.microsoft.com/office/powerpoint/2010/main" val="1796906992"/>
       </p:ext>
     </p:extLst>
   </p:cSld>
@@ -7050,7 +7315,7 @@
 </p:sld>
 </file>
 
-<file path=ppt/slides/slide3.xml><?xml version="1.0" encoding="utf-8"?>
+<file path=ppt/slides/slide2.xml><?xml version="1.0" encoding="utf-8"?>
 <p:sld xmlns:a="http://schemas.openxmlformats.org/drawingml/2006/main" xmlns:r="http://schemas.openxmlformats.org/officeDocument/2006/relationships" xmlns:p="http://schemas.openxmlformats.org/presentationml/2006/main">
   <p:cSld>
     <p:bg>
@@ -7702,7 +7967,7 @@
           <p:cNvPr id="2" name="Title 1">
             <a:extLst>
               <a:ext uri="{FF2B5EF4-FFF2-40B4-BE49-F238E27FC236}">
-                <a16:creationId xmlns:a16="http://schemas.microsoft.com/office/drawing/2014/main" id="{6C0937FD-3195-4E6E-AA7F-8D790A0A8ABA}"/>
+                <a16:creationId xmlns:a16="http://schemas.microsoft.com/office/drawing/2014/main" id="{5D199468-442B-44D8-8FB1-9E9E01386302}"/>
               </a:ext>
             </a:extLst>
           </p:cNvPr>
@@ -7732,56 +7997,62 @@
                   <a:srgbClr val="FFFFFF"/>
                 </a:solidFill>
               </a:rPr>
-              <a:t>Header</a:t>
+              <a:t>Descrizione del progetto</a:t>
             </a:r>
-            <a:endParaRPr lang="it-IT" sz="4000" dirty="0">
-              <a:solidFill>
-                <a:srgbClr val="FFFFFF"/>
-              </a:solidFill>
-            </a:endParaRPr>
-          </a:p>
-        </p:txBody>
-      </p:sp>
-      <p:pic>
-        <p:nvPicPr>
-          <p:cNvPr id="7" name="Immagine 6">
-            <a:extLst>
-              <a:ext uri="{FF2B5EF4-FFF2-40B4-BE49-F238E27FC236}">
-                <a16:creationId xmlns:a16="http://schemas.microsoft.com/office/drawing/2014/main" id="{74DC5FAB-0B9B-4ABC-905C-00AE9362B732}"/>
-              </a:ext>
-            </a:extLst>
-          </p:cNvPr>
-          <p:cNvPicPr>
-            <a:picLocks noChangeAspect="1"/>
-          </p:cNvPicPr>
-          <p:nvPr/>
-        </p:nvPicPr>
-        <p:blipFill>
-          <a:blip r:embed="rId2">
-            <a:extLst>
-              <a:ext uri="{28A0092B-C50C-407E-A947-70E740481C1C}">
-                <a14:useLocalDpi xmlns:a14="http://schemas.microsoft.com/office/drawing/2010/main" val="0"/>
-              </a:ext>
-            </a:extLst>
-          </a:blip>
-          <a:stretch>
-            <a:fillRect/>
-          </a:stretch>
-        </p:blipFill>
+          </a:p>
+        </p:txBody>
+      </p:sp>
+      <p:sp>
+        <p:nvSpPr>
+          <p:cNvPr id="3" name="Content Placeholder 2">
+            <a:extLst>
+              <a:ext uri="{FF2B5EF4-FFF2-40B4-BE49-F238E27FC236}">
+                <a16:creationId xmlns:a16="http://schemas.microsoft.com/office/drawing/2014/main" id="{A05D1882-65DE-484D-B983-8F24ECBDF31D}"/>
+              </a:ext>
+            </a:extLst>
+          </p:cNvPr>
+          <p:cNvSpPr>
+            <a:spLocks noGrp="1"/>
+          </p:cNvSpPr>
+          <p:nvPr>
+            <p:ph idx="1"/>
+          </p:nvPr>
+        </p:nvSpPr>
         <p:spPr>
           <a:xfrm>
-            <a:off x="4367695" y="243998"/>
-            <a:ext cx="7617929" cy="2815199"/>
+            <a:off x="4810259" y="649480"/>
+            <a:ext cx="6555347" cy="5546047"/>
           </a:xfrm>
-          <a:prstGeom prst="rect">
-            <a:avLst/>
-          </a:prstGeom>
         </p:spPr>
-      </p:pic>
+        <p:txBody>
+          <a:bodyPr anchor="ctr">
+            <a:normAutofit/>
+          </a:bodyPr>
+          <a:lstStyle/>
+          <a:p>
+            <a:r>
+              <a:rPr lang="it-IT" sz="2000" dirty="0"/>
+              <a:t>Il progetto riguarda la gestione informatica di una catena di supermercati</a:t>
+            </a:r>
+          </a:p>
+          <a:p>
+            <a:pPr lvl="1"/>
+            <a:r>
+              <a:rPr lang="it-IT" sz="2000" dirty="0"/>
+              <a:t>L’applicazione web presenterà una home page principale per tutti gli utenti e delle sezioni private per la gestione e la consultazione dei dati del </a:t>
+            </a:r>
+            <a:r>
+              <a:rPr lang="it-IT" sz="2000" dirty="0" err="1"/>
+              <a:t>databse</a:t>
+            </a:r>
+            <a:endParaRPr lang="it-IT" sz="2000" dirty="0"/>
+          </a:p>
+        </p:txBody>
+      </p:sp>
     </p:spTree>
     <p:extLst>
       <p:ext uri="{BB962C8B-B14F-4D97-AF65-F5344CB8AC3E}">
-        <p14:creationId xmlns:p14="http://schemas.microsoft.com/office/powerpoint/2010/main" val="3250376665"/>
+        <p14:creationId xmlns:p14="http://schemas.microsoft.com/office/powerpoint/2010/main" val="2693910554"/>
       </p:ext>
     </p:extLst>
   </p:cSld>
@@ -7791,7 +8062,7 @@
 </p:sld>
 </file>
 
-<file path=ppt/slides/slide4.xml><?xml version="1.0" encoding="utf-8"?>
+<file path=ppt/slides/slide3.xml><?xml version="1.0" encoding="utf-8"?>
 <p:sld xmlns:a="http://schemas.openxmlformats.org/drawingml/2006/main" xmlns:r="http://schemas.openxmlformats.org/officeDocument/2006/relationships" xmlns:p="http://schemas.openxmlformats.org/presentationml/2006/main">
   <p:cSld>
     <p:bg>
@@ -8468,22 +8739,27 @@
           <a:p>
             <a:pPr algn="r"/>
             <a:r>
-              <a:rPr lang="it-IT" sz="4000" dirty="0">
+              <a:rPr lang="it-IT" sz="4000">
                 <a:solidFill>
                   <a:srgbClr val="FFFFFF"/>
                 </a:solidFill>
               </a:rPr>
               <a:t>Header</a:t>
             </a:r>
+            <a:endParaRPr lang="it-IT" sz="4000" dirty="0">
+              <a:solidFill>
+                <a:srgbClr val="FFFFFF"/>
+              </a:solidFill>
+            </a:endParaRPr>
           </a:p>
         </p:txBody>
       </p:sp>
       <p:pic>
         <p:nvPicPr>
-          <p:cNvPr id="4" name="Immagine 3" descr="Immagine che contiene testo&#10;&#10;Descrizione generata automaticamente">
-            <a:extLst>
-              <a:ext uri="{FF2B5EF4-FFF2-40B4-BE49-F238E27FC236}">
-                <a16:creationId xmlns:a16="http://schemas.microsoft.com/office/drawing/2014/main" id="{A1287AF1-2B59-4FEB-81BA-4A0ED107C8F7}"/>
+          <p:cNvPr id="7" name="Immagine 6">
+            <a:extLst>
+              <a:ext uri="{FF2B5EF4-FFF2-40B4-BE49-F238E27FC236}">
+                <a16:creationId xmlns:a16="http://schemas.microsoft.com/office/drawing/2014/main" id="{74DC5FAB-0B9B-4ABC-905C-00AE9362B732}"/>
               </a:ext>
             </a:extLst>
           </p:cNvPr>
@@ -8506,8 +8782,8 @@
         </p:blipFill>
         <p:spPr>
           <a:xfrm>
-            <a:off x="4905054" y="547468"/>
-            <a:ext cx="6605105" cy="5763064"/>
+            <a:off x="4367695" y="243998"/>
+            <a:ext cx="7617929" cy="2815199"/>
           </a:xfrm>
           <a:prstGeom prst="rect">
             <a:avLst/>
@@ -8517,7 +8793,7 @@
     </p:spTree>
     <p:extLst>
       <p:ext uri="{BB962C8B-B14F-4D97-AF65-F5344CB8AC3E}">
-        <p14:creationId xmlns:p14="http://schemas.microsoft.com/office/powerpoint/2010/main" val="1936677726"/>
+        <p14:creationId xmlns:p14="http://schemas.microsoft.com/office/powerpoint/2010/main" val="3250376665"/>
       </p:ext>
     </p:extLst>
   </p:cSld>
@@ -8527,7 +8803,7 @@
 </p:sld>
 </file>
 
-<file path=ppt/slides/slide5.xml><?xml version="1.0" encoding="utf-8"?>
+<file path=ppt/slides/slide4.xml><?xml version="1.0" encoding="utf-8"?>
 <p:sld xmlns:a="http://schemas.openxmlformats.org/drawingml/2006/main" xmlns:r="http://schemas.openxmlformats.org/officeDocument/2006/relationships" xmlns:p="http://schemas.openxmlformats.org/presentationml/2006/main">
   <p:cSld>
     <p:bg>
@@ -9216,10 +9492,10 @@
       </p:sp>
       <p:pic>
         <p:nvPicPr>
-          <p:cNvPr id="28" name="Immagine 27" descr="Immagine che contiene testo&#10;&#10;Descrizione generata automaticamente">
-            <a:extLst>
-              <a:ext uri="{FF2B5EF4-FFF2-40B4-BE49-F238E27FC236}">
-                <a16:creationId xmlns:a16="http://schemas.microsoft.com/office/drawing/2014/main" id="{242E4CA8-B2B3-497C-89E9-B285C2139D1E}"/>
+          <p:cNvPr id="4" name="Immagine 3" descr="Immagine che contiene testo&#10;&#10;Descrizione generata automaticamente">
+            <a:extLst>
+              <a:ext uri="{FF2B5EF4-FFF2-40B4-BE49-F238E27FC236}">
+                <a16:creationId xmlns:a16="http://schemas.microsoft.com/office/drawing/2014/main" id="{A1287AF1-2B59-4FEB-81BA-4A0ED107C8F7}"/>
               </a:ext>
             </a:extLst>
           </p:cNvPr>
@@ -9242,44 +9518,8 @@
         </p:blipFill>
         <p:spPr>
           <a:xfrm>
-            <a:off x="4504548" y="169124"/>
-            <a:ext cx="4368342" cy="6519750"/>
-          </a:xfrm>
-          <a:prstGeom prst="rect">
-            <a:avLst/>
-          </a:prstGeom>
-        </p:spPr>
-      </p:pic>
-      <p:pic>
-        <p:nvPicPr>
-          <p:cNvPr id="26" name="Immagine 25" descr="Immagine che contiene testo&#10;&#10;Descrizione generata automaticamente">
-            <a:extLst>
-              <a:ext uri="{FF2B5EF4-FFF2-40B4-BE49-F238E27FC236}">
-                <a16:creationId xmlns:a16="http://schemas.microsoft.com/office/drawing/2014/main" id="{F85B0B2B-EF1E-42AC-AABC-C97833017597}"/>
-              </a:ext>
-            </a:extLst>
-          </p:cNvPr>
-          <p:cNvPicPr>
-            <a:picLocks noChangeAspect="1"/>
-          </p:cNvPicPr>
-          <p:nvPr/>
-        </p:nvPicPr>
-        <p:blipFill>
-          <a:blip r:embed="rId3">
-            <a:extLst>
-              <a:ext uri="{28A0092B-C50C-407E-A947-70E740481C1C}">
-                <a14:useLocalDpi xmlns:a14="http://schemas.microsoft.com/office/drawing/2010/main" val="0"/>
-              </a:ext>
-            </a:extLst>
-          </a:blip>
-          <a:stretch>
-            <a:fillRect/>
-          </a:stretch>
-        </p:blipFill>
-        <p:spPr>
-          <a:xfrm>
-            <a:off x="8000483" y="2213779"/>
-            <a:ext cx="3724795" cy="2410161"/>
+            <a:off x="4905054" y="547468"/>
+            <a:ext cx="6605105" cy="5763064"/>
           </a:xfrm>
           <a:prstGeom prst="rect">
             <a:avLst/>
@@ -9289,7 +9529,7 @@
     </p:spTree>
     <p:extLst>
       <p:ext uri="{BB962C8B-B14F-4D97-AF65-F5344CB8AC3E}">
-        <p14:creationId xmlns:p14="http://schemas.microsoft.com/office/powerpoint/2010/main" val="1726946906"/>
+        <p14:creationId xmlns:p14="http://schemas.microsoft.com/office/powerpoint/2010/main" val="1936677726"/>
       </p:ext>
     </p:extLst>
   </p:cSld>
@@ -9299,7 +9539,7 @@
 </p:sld>
 </file>
 
-<file path=ppt/slides/slide6.xml><?xml version="1.0" encoding="utf-8"?>
+<file path=ppt/slides/slide5.xml><?xml version="1.0" encoding="utf-8"?>
 <p:sld xmlns:a="http://schemas.openxmlformats.org/drawingml/2006/main" xmlns:r="http://schemas.openxmlformats.org/officeDocument/2006/relationships" xmlns:p="http://schemas.openxmlformats.org/presentationml/2006/main">
   <p:cSld>
     <p:bg>
@@ -9951,7 +10191,7 @@
           <p:cNvPr id="2" name="Title 1">
             <a:extLst>
               <a:ext uri="{FF2B5EF4-FFF2-40B4-BE49-F238E27FC236}">
-                <a16:creationId xmlns:a16="http://schemas.microsoft.com/office/drawing/2014/main" id="{E9FFD19F-75CA-4966-B79C-2935A271ADBD}"/>
+                <a16:creationId xmlns:a16="http://schemas.microsoft.com/office/drawing/2014/main" id="{6C0937FD-3195-4E6E-AA7F-8D790A0A8ABA}"/>
               </a:ext>
             </a:extLst>
           </p:cNvPr>
@@ -9981,17 +10221,17 @@
                   <a:srgbClr val="FFFFFF"/>
                 </a:solidFill>
               </a:rPr>
-              <a:t>Menù navigazione</a:t>
+              <a:t>Header</a:t>
             </a:r>
           </a:p>
         </p:txBody>
       </p:sp>
       <p:pic>
         <p:nvPicPr>
-          <p:cNvPr id="7" name="Immagine 6">
-            <a:extLst>
-              <a:ext uri="{FF2B5EF4-FFF2-40B4-BE49-F238E27FC236}">
-                <a16:creationId xmlns:a16="http://schemas.microsoft.com/office/drawing/2014/main" id="{4FF4D450-AAB5-440F-A3C1-95DAE6EA46F6}"/>
+          <p:cNvPr id="28" name="Immagine 27" descr="Immagine che contiene testo&#10;&#10;Descrizione generata automaticamente">
+            <a:extLst>
+              <a:ext uri="{FF2B5EF4-FFF2-40B4-BE49-F238E27FC236}">
+                <a16:creationId xmlns:a16="http://schemas.microsoft.com/office/drawing/2014/main" id="{242E4CA8-B2B3-497C-89E9-B285C2139D1E}"/>
               </a:ext>
             </a:extLst>
           </p:cNvPr>
@@ -10014,8 +10254,8 @@
         </p:blipFill>
         <p:spPr>
           <a:xfrm>
-            <a:off x="4216849" y="55686"/>
-            <a:ext cx="7793071" cy="455702"/>
+            <a:off x="4504548" y="169124"/>
+            <a:ext cx="4368342" cy="6519750"/>
           </a:xfrm>
           <a:prstGeom prst="rect">
             <a:avLst/>
@@ -10024,10 +10264,10 @@
       </p:pic>
       <p:pic>
         <p:nvPicPr>
-          <p:cNvPr id="11" name="Immagine 10" descr="Immagine che contiene testo&#10;&#10;Descrizione generata automaticamente">
-            <a:extLst>
-              <a:ext uri="{FF2B5EF4-FFF2-40B4-BE49-F238E27FC236}">
-                <a16:creationId xmlns:a16="http://schemas.microsoft.com/office/drawing/2014/main" id="{1BFB8B2A-F40E-41C0-8B5B-70BB689E76D4}"/>
+          <p:cNvPr id="26" name="Immagine 25" descr="Immagine che contiene testo&#10;&#10;Descrizione generata automaticamente">
+            <a:extLst>
+              <a:ext uri="{FF2B5EF4-FFF2-40B4-BE49-F238E27FC236}">
+                <a16:creationId xmlns:a16="http://schemas.microsoft.com/office/drawing/2014/main" id="{F85B0B2B-EF1E-42AC-AABC-C97833017597}"/>
               </a:ext>
             </a:extLst>
           </p:cNvPr>
@@ -10050,44 +10290,8 @@
         </p:blipFill>
         <p:spPr>
           <a:xfrm>
-            <a:off x="8827345" y="2298329"/>
-            <a:ext cx="2448267" cy="2057687"/>
-          </a:xfrm>
-          <a:prstGeom prst="rect">
-            <a:avLst/>
-          </a:prstGeom>
-        </p:spPr>
-      </p:pic>
-      <p:pic>
-        <p:nvPicPr>
-          <p:cNvPr id="15" name="Immagine 14" descr="Immagine che contiene testo&#10;&#10;Descrizione generata automaticamente">
-            <a:extLst>
-              <a:ext uri="{FF2B5EF4-FFF2-40B4-BE49-F238E27FC236}">
-                <a16:creationId xmlns:a16="http://schemas.microsoft.com/office/drawing/2014/main" id="{EAF874ED-D329-4909-B7F1-5A7BEE1EC4A2}"/>
-              </a:ext>
-            </a:extLst>
-          </p:cNvPr>
-          <p:cNvPicPr>
-            <a:picLocks noChangeAspect="1"/>
-          </p:cNvPicPr>
-          <p:nvPr/>
-        </p:nvPicPr>
-        <p:blipFill>
-          <a:blip r:embed="rId4">
-            <a:extLst>
-              <a:ext uri="{28A0092B-C50C-407E-A947-70E740481C1C}">
-                <a14:useLocalDpi xmlns:a14="http://schemas.microsoft.com/office/drawing/2010/main" val="0"/>
-              </a:ext>
-            </a:extLst>
-          </a:blip>
-          <a:stretch>
-            <a:fillRect/>
-          </a:stretch>
-        </p:blipFill>
-        <p:spPr>
-          <a:xfrm>
-            <a:off x="4613052" y="718758"/>
-            <a:ext cx="3639058" cy="5420481"/>
+            <a:off x="8000483" y="2213779"/>
+            <a:ext cx="3724795" cy="2410161"/>
           </a:xfrm>
           <a:prstGeom prst="rect">
             <a:avLst/>
@@ -10097,7 +10301,7 @@
     </p:spTree>
     <p:extLst>
       <p:ext uri="{BB962C8B-B14F-4D97-AF65-F5344CB8AC3E}">
-        <p14:creationId xmlns:p14="http://schemas.microsoft.com/office/powerpoint/2010/main" val="3560495755"/>
+        <p14:creationId xmlns:p14="http://schemas.microsoft.com/office/powerpoint/2010/main" val="1726946906"/>
       </p:ext>
     </p:extLst>
   </p:cSld>
@@ -10107,7 +10311,7 @@
 </p:sld>
 </file>
 
-<file path=ppt/slides/slide7.xml><?xml version="1.0" encoding="utf-8"?>
+<file path=ppt/slides/slide6.xml><?xml version="1.0" encoding="utf-8"?>
 <p:sld xmlns:a="http://schemas.openxmlformats.org/drawingml/2006/main" xmlns:r="http://schemas.openxmlformats.org/officeDocument/2006/relationships" xmlns:p="http://schemas.openxmlformats.org/presentationml/2006/main">
   <p:cSld>
     <p:bg>
@@ -10203,37 +10407,8 @@
           <a:bodyPr rtlCol="0" anchor="ctr"/>
           <a:lstStyle/>
           <a:p>
-            <a:pPr marL="0" marR="0" lvl="0" indent="0" algn="ctr" defTabSz="914400" rtl="0" eaLnBrk="1" fontAlgn="auto" latinLnBrk="0" hangingPunct="1">
-              <a:lnSpc>
-                <a:spcPct val="100000"/>
-              </a:lnSpc>
-              <a:spcBef>
-                <a:spcPts val="0"/>
-              </a:spcBef>
-              <a:spcAft>
-                <a:spcPts val="0"/>
-              </a:spcAft>
-              <a:buClrTx/>
-              <a:buSzTx/>
-              <a:buFontTx/>
-              <a:buNone/>
-              <a:tabLst/>
-              <a:defRPr/>
-            </a:pPr>
-            <a:endParaRPr kumimoji="0" lang="en-US" sz="1800" b="0" i="0" u="none" strike="noStrike" kern="1200" cap="none" spc="0" normalizeH="0" baseline="0" noProof="0">
-              <a:ln>
-                <a:noFill/>
-              </a:ln>
-              <a:solidFill>
-                <a:prstClr val="white"/>
-              </a:solidFill>
-              <a:effectLst/>
-              <a:uLnTx/>
-              <a:uFillTx/>
-              <a:latin typeface="Calibri" panose="020F0502020204030204"/>
-              <a:ea typeface="+mn-ea"/>
-              <a:cs typeface="+mn-cs"/>
-            </a:endParaRPr>
+            <a:pPr algn="ctr"/>
+            <a:endParaRPr lang="en-US"/>
           </a:p>
         </p:txBody>
       </p:sp>
@@ -10308,37 +10483,8 @@
           <a:bodyPr rtlCol="0" anchor="ctr"/>
           <a:lstStyle/>
           <a:p>
-            <a:pPr marL="0" marR="0" lvl="0" indent="0" algn="ctr" defTabSz="914400" rtl="0" eaLnBrk="1" fontAlgn="auto" latinLnBrk="0" hangingPunct="1">
-              <a:lnSpc>
-                <a:spcPct val="100000"/>
-              </a:lnSpc>
-              <a:spcBef>
-                <a:spcPts val="0"/>
-              </a:spcBef>
-              <a:spcAft>
-                <a:spcPts val="0"/>
-              </a:spcAft>
-              <a:buClrTx/>
-              <a:buSzTx/>
-              <a:buFontTx/>
-              <a:buNone/>
-              <a:tabLst/>
-              <a:defRPr/>
-            </a:pPr>
-            <a:endParaRPr kumimoji="0" lang="en-US" sz="1800" b="0" i="0" u="none" strike="noStrike" kern="1200" cap="none" spc="0" normalizeH="0" baseline="0" noProof="0">
-              <a:ln>
-                <a:noFill/>
-              </a:ln>
-              <a:solidFill>
-                <a:prstClr val="white"/>
-              </a:solidFill>
-              <a:effectLst/>
-              <a:uLnTx/>
-              <a:uFillTx/>
-              <a:latin typeface="Calibri" panose="020F0502020204030204"/>
-              <a:ea typeface="+mn-ea"/>
-              <a:cs typeface="+mn-cs"/>
-            </a:endParaRPr>
+            <a:pPr algn="ctr"/>
+            <a:endParaRPr lang="en-US"/>
           </a:p>
         </p:txBody>
       </p:sp>
@@ -10410,37 +10556,8 @@
           <a:bodyPr rtlCol="0" anchor="ctr"/>
           <a:lstStyle/>
           <a:p>
-            <a:pPr marL="0" marR="0" lvl="0" indent="0" algn="ctr" defTabSz="914400" rtl="0" eaLnBrk="1" fontAlgn="auto" latinLnBrk="0" hangingPunct="1">
-              <a:lnSpc>
-                <a:spcPct val="100000"/>
-              </a:lnSpc>
-              <a:spcBef>
-                <a:spcPts val="0"/>
-              </a:spcBef>
-              <a:spcAft>
-                <a:spcPts val="0"/>
-              </a:spcAft>
-              <a:buClrTx/>
-              <a:buSzTx/>
-              <a:buFontTx/>
-              <a:buNone/>
-              <a:tabLst/>
-              <a:defRPr/>
-            </a:pPr>
-            <a:endParaRPr kumimoji="0" lang="en-US" sz="1800" b="0" i="0" u="none" strike="noStrike" kern="1200" cap="none" spc="0" normalizeH="0" baseline="0" noProof="0">
-              <a:ln>
-                <a:noFill/>
-              </a:ln>
-              <a:solidFill>
-                <a:prstClr val="white"/>
-              </a:solidFill>
-              <a:effectLst/>
-              <a:uLnTx/>
-              <a:uFillTx/>
-              <a:latin typeface="Calibri" panose="020F0502020204030204"/>
-              <a:ea typeface="+mn-ea"/>
-              <a:cs typeface="+mn-cs"/>
-            </a:endParaRPr>
+            <a:pPr algn="ctr"/>
+            <a:endParaRPr lang="en-US"/>
           </a:p>
         </p:txBody>
       </p:sp>
@@ -10514,37 +10631,8 @@
           <a:bodyPr rtlCol="0" anchor="ctr"/>
           <a:lstStyle/>
           <a:p>
-            <a:pPr marL="0" marR="0" lvl="0" indent="0" algn="ctr" defTabSz="914400" rtl="0" eaLnBrk="1" fontAlgn="auto" latinLnBrk="0" hangingPunct="1">
-              <a:lnSpc>
-                <a:spcPct val="100000"/>
-              </a:lnSpc>
-              <a:spcBef>
-                <a:spcPts val="0"/>
-              </a:spcBef>
-              <a:spcAft>
-                <a:spcPts val="0"/>
-              </a:spcAft>
-              <a:buClrTx/>
-              <a:buSzTx/>
-              <a:buFontTx/>
-              <a:buNone/>
-              <a:tabLst/>
-              <a:defRPr/>
-            </a:pPr>
-            <a:endParaRPr kumimoji="0" lang="en-US" sz="1800" b="0" i="0" u="none" strike="noStrike" kern="1200" cap="none" spc="0" normalizeH="0" baseline="0" noProof="0">
-              <a:ln>
-                <a:noFill/>
-              </a:ln>
-              <a:solidFill>
-                <a:prstClr val="white"/>
-              </a:solidFill>
-              <a:effectLst/>
-              <a:uLnTx/>
-              <a:uFillTx/>
-              <a:latin typeface="Calibri" panose="020F0502020204030204"/>
-              <a:ea typeface="+mn-ea"/>
-              <a:cs typeface="+mn-cs"/>
-            </a:endParaRPr>
+            <a:pPr algn="ctr"/>
+            <a:endParaRPr lang="en-US"/>
           </a:p>
         </p:txBody>
       </p:sp>
@@ -10618,37 +10706,8 @@
           <a:bodyPr rtlCol="0" anchor="ctr"/>
           <a:lstStyle/>
           <a:p>
-            <a:pPr marL="0" marR="0" lvl="0" indent="0" algn="ctr" defTabSz="914400" rtl="0" eaLnBrk="1" fontAlgn="auto" latinLnBrk="0" hangingPunct="1">
-              <a:lnSpc>
-                <a:spcPct val="100000"/>
-              </a:lnSpc>
-              <a:spcBef>
-                <a:spcPts val="0"/>
-              </a:spcBef>
-              <a:spcAft>
-                <a:spcPts val="0"/>
-              </a:spcAft>
-              <a:buClrTx/>
-              <a:buSzTx/>
-              <a:buFontTx/>
-              <a:buNone/>
-              <a:tabLst/>
-              <a:defRPr/>
-            </a:pPr>
-            <a:endParaRPr kumimoji="0" lang="en-US" sz="1800" b="0" i="0" u="none" strike="noStrike" kern="1200" cap="none" spc="0" normalizeH="0" baseline="0" noProof="0" dirty="0">
-              <a:ln>
-                <a:noFill/>
-              </a:ln>
-              <a:solidFill>
-                <a:prstClr val="white"/>
-              </a:solidFill>
-              <a:effectLst/>
-              <a:uLnTx/>
-              <a:uFillTx/>
-              <a:latin typeface="Calibri" panose="020F0502020204030204"/>
-              <a:ea typeface="+mn-ea"/>
-              <a:cs typeface="+mn-cs"/>
-            </a:endParaRPr>
+            <a:pPr algn="ctr"/>
+            <a:endParaRPr lang="en-US" dirty="0"/>
           </a:p>
         </p:txBody>
       </p:sp>
@@ -10817,37 +10876,8 @@
           </a:bodyPr>
           <a:lstStyle/>
           <a:p>
-            <a:pPr marL="0" marR="0" lvl="0" indent="0" algn="ctr" defTabSz="914400" rtl="0" eaLnBrk="1" fontAlgn="auto" latinLnBrk="0" hangingPunct="1">
-              <a:lnSpc>
-                <a:spcPct val="100000"/>
-              </a:lnSpc>
-              <a:spcBef>
-                <a:spcPts val="0"/>
-              </a:spcBef>
-              <a:spcAft>
-                <a:spcPts val="0"/>
-              </a:spcAft>
-              <a:buClrTx/>
-              <a:buSzTx/>
-              <a:buFontTx/>
-              <a:buNone/>
-              <a:tabLst/>
-              <a:defRPr/>
-            </a:pPr>
-            <a:endParaRPr kumimoji="0" lang="en-US" sz="1800" b="0" i="0" u="none" strike="noStrike" kern="1200" cap="none" spc="0" normalizeH="0" baseline="0" noProof="0" dirty="0">
-              <a:ln>
-                <a:noFill/>
-              </a:ln>
-              <a:solidFill>
-                <a:prstClr val="white"/>
-              </a:solidFill>
-              <a:effectLst/>
-              <a:uLnTx/>
-              <a:uFillTx/>
-              <a:latin typeface="Calibri" panose="020F0502020204030204"/>
-              <a:ea typeface="+mn-ea"/>
-              <a:cs typeface="+mn-cs"/>
-            </a:endParaRPr>
+            <a:pPr algn="ctr"/>
+            <a:endParaRPr lang="en-US" dirty="0"/>
           </a:p>
         </p:txBody>
       </p:sp>
@@ -10923,37 +10953,8 @@
           <a:bodyPr rtlCol="0" anchor="ctr"/>
           <a:lstStyle/>
           <a:p>
-            <a:pPr marL="0" marR="0" lvl="0" indent="0" algn="ctr" defTabSz="914400" rtl="0" eaLnBrk="1" fontAlgn="auto" latinLnBrk="0" hangingPunct="1">
-              <a:lnSpc>
-                <a:spcPct val="100000"/>
-              </a:lnSpc>
-              <a:spcBef>
-                <a:spcPts val="0"/>
-              </a:spcBef>
-              <a:spcAft>
-                <a:spcPts val="0"/>
-              </a:spcAft>
-              <a:buClrTx/>
-              <a:buSzTx/>
-              <a:buFontTx/>
-              <a:buNone/>
-              <a:tabLst/>
-              <a:defRPr/>
-            </a:pPr>
-            <a:endParaRPr kumimoji="0" lang="en-US" sz="1800" b="0" i="0" u="none" strike="noStrike" kern="1200" cap="none" spc="0" normalizeH="0" baseline="0" noProof="0">
-              <a:ln>
-                <a:noFill/>
-              </a:ln>
-              <a:solidFill>
-                <a:prstClr val="white"/>
-              </a:solidFill>
-              <a:effectLst/>
-              <a:uLnTx/>
-              <a:uFillTx/>
-              <a:latin typeface="Calibri" panose="020F0502020204030204"/>
-              <a:ea typeface="+mn-ea"/>
-              <a:cs typeface="+mn-cs"/>
-            </a:endParaRPr>
+            <a:pPr algn="ctr"/>
+            <a:endParaRPr lang="en-US"/>
           </a:p>
         </p:txBody>
       </p:sp>
@@ -10992,7 +10993,7 @@
                   <a:srgbClr val="FFFFFF"/>
                 </a:solidFill>
               </a:rPr>
-              <a:t>Sezione contenuti</a:t>
+              <a:t>Menù navigazione</a:t>
             </a:r>
           </a:p>
         </p:txBody>
@@ -11002,7 +11003,7 @@
           <p:cNvPr id="7" name="Immagine 6">
             <a:extLst>
               <a:ext uri="{FF2B5EF4-FFF2-40B4-BE49-F238E27FC236}">
-                <a16:creationId xmlns:a16="http://schemas.microsoft.com/office/drawing/2014/main" id="{915692DD-2A53-4977-AD00-5919370BC5B6}"/>
+                <a16:creationId xmlns:a16="http://schemas.microsoft.com/office/drawing/2014/main" id="{4FF4D450-AAB5-440F-A3C1-95DAE6EA46F6}"/>
               </a:ext>
             </a:extLst>
           </p:cNvPr>
@@ -11025,50 +11026,20 @@
         </p:blipFill>
         <p:spPr>
           <a:xfrm>
-            <a:off x="5240185" y="404033"/>
-            <a:ext cx="5827966" cy="2603618"/>
+            <a:off x="4216849" y="55686"/>
+            <a:ext cx="7793071" cy="455702"/>
           </a:xfrm>
           <a:prstGeom prst="rect">
             <a:avLst/>
           </a:prstGeom>
-          <a:solidFill>
-            <a:srgbClr val="FFFFFF">
-              <a:shade val="85000"/>
-            </a:srgbClr>
-          </a:solidFill>
-          <a:ln w="88900" cap="sq">
-            <a:solidFill>
-              <a:srgbClr val="FFFFFF"/>
-            </a:solidFill>
-            <a:miter lim="800000"/>
-          </a:ln>
-          <a:effectLst>
-            <a:outerShdw blurRad="55000" dist="18000" dir="5400000" algn="tl" rotWithShape="0">
-              <a:srgbClr val="000000">
-                <a:alpha val="40000"/>
-              </a:srgbClr>
-            </a:outerShdw>
-          </a:effectLst>
-          <a:scene3d>
-            <a:camera prst="orthographicFront"/>
-            <a:lightRig rig="twoPt" dir="t">
-              <a:rot lat="0" lon="0" rev="7200000"/>
-            </a:lightRig>
-          </a:scene3d>
-          <a:sp3d>
-            <a:bevelT w="25400" h="19050"/>
-            <a:contourClr>
-              <a:srgbClr val="FFFFFF"/>
-            </a:contourClr>
-          </a:sp3d>
         </p:spPr>
       </p:pic>
       <p:pic>
         <p:nvPicPr>
-          <p:cNvPr id="11" name="Immagine 10">
-            <a:extLst>
-              <a:ext uri="{FF2B5EF4-FFF2-40B4-BE49-F238E27FC236}">
-                <a16:creationId xmlns:a16="http://schemas.microsoft.com/office/drawing/2014/main" id="{BF82D4F2-A62A-48D7-AEC5-D680EB630226}"/>
+          <p:cNvPr id="4" name="Immagine 3" descr="Immagine che contiene testo&#10;&#10;Descrizione generata automaticamente">
+            <a:extLst>
+              <a:ext uri="{FF2B5EF4-FFF2-40B4-BE49-F238E27FC236}">
+                <a16:creationId xmlns:a16="http://schemas.microsoft.com/office/drawing/2014/main" id="{D41874BD-E104-4EB6-A715-C0631B08CDCA}"/>
               </a:ext>
             </a:extLst>
           </p:cNvPr>
@@ -11091,48 +11062,18 @@
         </p:blipFill>
         <p:spPr>
           <a:xfrm>
-            <a:off x="5240185" y="3574733"/>
-            <a:ext cx="5827966" cy="2609859"/>
+            <a:off x="4918580" y="1795233"/>
+            <a:ext cx="6115904" cy="3267531"/>
           </a:xfrm>
           <a:prstGeom prst="rect">
             <a:avLst/>
           </a:prstGeom>
-          <a:solidFill>
-            <a:srgbClr val="FFFFFF">
-              <a:shade val="85000"/>
-            </a:srgbClr>
-          </a:solidFill>
-          <a:ln w="88900" cap="sq">
-            <a:solidFill>
-              <a:srgbClr val="FFFFFF"/>
-            </a:solidFill>
-            <a:miter lim="800000"/>
-          </a:ln>
-          <a:effectLst>
-            <a:outerShdw blurRad="55000" dist="18000" dir="5400000" algn="tl" rotWithShape="0">
-              <a:srgbClr val="000000">
-                <a:alpha val="40000"/>
-              </a:srgbClr>
-            </a:outerShdw>
-          </a:effectLst>
-          <a:scene3d>
-            <a:camera prst="orthographicFront"/>
-            <a:lightRig rig="twoPt" dir="t">
-              <a:rot lat="0" lon="0" rev="7200000"/>
-            </a:lightRig>
-          </a:scene3d>
-          <a:sp3d>
-            <a:bevelT w="25400" h="19050"/>
-            <a:contourClr>
-              <a:srgbClr val="FFFFFF"/>
-            </a:contourClr>
-          </a:sp3d>
         </p:spPr>
       </p:pic>
     </p:spTree>
     <p:extLst>
       <p:ext uri="{BB962C8B-B14F-4D97-AF65-F5344CB8AC3E}">
-        <p14:creationId xmlns:p14="http://schemas.microsoft.com/office/powerpoint/2010/main" val="994131774"/>
+        <p14:creationId xmlns:p14="http://schemas.microsoft.com/office/powerpoint/2010/main" val="3560495755"/>
       </p:ext>
     </p:extLst>
   </p:cSld>
@@ -11142,7 +11083,7 @@
 </p:sld>
 </file>
 
-<file path=ppt/slides/slide8.xml><?xml version="1.0" encoding="utf-8"?>
+<file path=ppt/slides/slide7.xml><?xml version="1.0" encoding="utf-8"?>
 <p:sld xmlns:a="http://schemas.openxmlformats.org/drawingml/2006/main" xmlns:r="http://schemas.openxmlformats.org/officeDocument/2006/relationships" xmlns:p="http://schemas.openxmlformats.org/presentationml/2006/main">
   <p:cSld>
     <p:bg>
@@ -11238,37 +11179,8 @@
           <a:bodyPr rtlCol="0" anchor="ctr"/>
           <a:lstStyle/>
           <a:p>
-            <a:pPr marL="0" marR="0" lvl="0" indent="0" algn="ctr" defTabSz="914400" rtl="0" eaLnBrk="1" fontAlgn="auto" latinLnBrk="0" hangingPunct="1">
-              <a:lnSpc>
-                <a:spcPct val="100000"/>
-              </a:lnSpc>
-              <a:spcBef>
-                <a:spcPts val="0"/>
-              </a:spcBef>
-              <a:spcAft>
-                <a:spcPts val="0"/>
-              </a:spcAft>
-              <a:buClrTx/>
-              <a:buSzTx/>
-              <a:buFontTx/>
-              <a:buNone/>
-              <a:tabLst/>
-              <a:defRPr/>
-            </a:pPr>
-            <a:endParaRPr kumimoji="0" lang="en-US" sz="1800" b="0" i="0" u="none" strike="noStrike" kern="1200" cap="none" spc="0" normalizeH="0" baseline="0" noProof="0">
-              <a:ln>
-                <a:noFill/>
-              </a:ln>
-              <a:solidFill>
-                <a:prstClr val="white"/>
-              </a:solidFill>
-              <a:effectLst/>
-              <a:uLnTx/>
-              <a:uFillTx/>
-              <a:latin typeface="Calibri" panose="020F0502020204030204"/>
-              <a:ea typeface="+mn-ea"/>
-              <a:cs typeface="+mn-cs"/>
-            </a:endParaRPr>
+            <a:pPr algn="ctr"/>
+            <a:endParaRPr lang="en-US"/>
           </a:p>
         </p:txBody>
       </p:sp>
@@ -11343,37 +11255,8 @@
           <a:bodyPr rtlCol="0" anchor="ctr"/>
           <a:lstStyle/>
           <a:p>
-            <a:pPr marL="0" marR="0" lvl="0" indent="0" algn="ctr" defTabSz="914400" rtl="0" eaLnBrk="1" fontAlgn="auto" latinLnBrk="0" hangingPunct="1">
-              <a:lnSpc>
-                <a:spcPct val="100000"/>
-              </a:lnSpc>
-              <a:spcBef>
-                <a:spcPts val="0"/>
-              </a:spcBef>
-              <a:spcAft>
-                <a:spcPts val="0"/>
-              </a:spcAft>
-              <a:buClrTx/>
-              <a:buSzTx/>
-              <a:buFontTx/>
-              <a:buNone/>
-              <a:tabLst/>
-              <a:defRPr/>
-            </a:pPr>
-            <a:endParaRPr kumimoji="0" lang="en-US" sz="1800" b="0" i="0" u="none" strike="noStrike" kern="1200" cap="none" spc="0" normalizeH="0" baseline="0" noProof="0">
-              <a:ln>
-                <a:noFill/>
-              </a:ln>
-              <a:solidFill>
-                <a:prstClr val="white"/>
-              </a:solidFill>
-              <a:effectLst/>
-              <a:uLnTx/>
-              <a:uFillTx/>
-              <a:latin typeface="Calibri" panose="020F0502020204030204"/>
-              <a:ea typeface="+mn-ea"/>
-              <a:cs typeface="+mn-cs"/>
-            </a:endParaRPr>
+            <a:pPr algn="ctr"/>
+            <a:endParaRPr lang="en-US"/>
           </a:p>
         </p:txBody>
       </p:sp>
@@ -11445,37 +11328,8 @@
           <a:bodyPr rtlCol="0" anchor="ctr"/>
           <a:lstStyle/>
           <a:p>
-            <a:pPr marL="0" marR="0" lvl="0" indent="0" algn="ctr" defTabSz="914400" rtl="0" eaLnBrk="1" fontAlgn="auto" latinLnBrk="0" hangingPunct="1">
-              <a:lnSpc>
-                <a:spcPct val="100000"/>
-              </a:lnSpc>
-              <a:spcBef>
-                <a:spcPts val="0"/>
-              </a:spcBef>
-              <a:spcAft>
-                <a:spcPts val="0"/>
-              </a:spcAft>
-              <a:buClrTx/>
-              <a:buSzTx/>
-              <a:buFontTx/>
-              <a:buNone/>
-              <a:tabLst/>
-              <a:defRPr/>
-            </a:pPr>
-            <a:endParaRPr kumimoji="0" lang="en-US" sz="1800" b="0" i="0" u="none" strike="noStrike" kern="1200" cap="none" spc="0" normalizeH="0" baseline="0" noProof="0">
-              <a:ln>
-                <a:noFill/>
-              </a:ln>
-              <a:solidFill>
-                <a:prstClr val="white"/>
-              </a:solidFill>
-              <a:effectLst/>
-              <a:uLnTx/>
-              <a:uFillTx/>
-              <a:latin typeface="Calibri" panose="020F0502020204030204"/>
-              <a:ea typeface="+mn-ea"/>
-              <a:cs typeface="+mn-cs"/>
-            </a:endParaRPr>
+            <a:pPr algn="ctr"/>
+            <a:endParaRPr lang="en-US"/>
           </a:p>
         </p:txBody>
       </p:sp>
@@ -11549,37 +11403,8 @@
           <a:bodyPr rtlCol="0" anchor="ctr"/>
           <a:lstStyle/>
           <a:p>
-            <a:pPr marL="0" marR="0" lvl="0" indent="0" algn="ctr" defTabSz="914400" rtl="0" eaLnBrk="1" fontAlgn="auto" latinLnBrk="0" hangingPunct="1">
-              <a:lnSpc>
-                <a:spcPct val="100000"/>
-              </a:lnSpc>
-              <a:spcBef>
-                <a:spcPts val="0"/>
-              </a:spcBef>
-              <a:spcAft>
-                <a:spcPts val="0"/>
-              </a:spcAft>
-              <a:buClrTx/>
-              <a:buSzTx/>
-              <a:buFontTx/>
-              <a:buNone/>
-              <a:tabLst/>
-              <a:defRPr/>
-            </a:pPr>
-            <a:endParaRPr kumimoji="0" lang="en-US" sz="1800" b="0" i="0" u="none" strike="noStrike" kern="1200" cap="none" spc="0" normalizeH="0" baseline="0" noProof="0">
-              <a:ln>
-                <a:noFill/>
-              </a:ln>
-              <a:solidFill>
-                <a:prstClr val="white"/>
-              </a:solidFill>
-              <a:effectLst/>
-              <a:uLnTx/>
-              <a:uFillTx/>
-              <a:latin typeface="Calibri" panose="020F0502020204030204"/>
-              <a:ea typeface="+mn-ea"/>
-              <a:cs typeface="+mn-cs"/>
-            </a:endParaRPr>
+            <a:pPr algn="ctr"/>
+            <a:endParaRPr lang="en-US"/>
           </a:p>
         </p:txBody>
       </p:sp>
@@ -11653,37 +11478,8 @@
           <a:bodyPr rtlCol="0" anchor="ctr"/>
           <a:lstStyle/>
           <a:p>
-            <a:pPr marL="0" marR="0" lvl="0" indent="0" algn="ctr" defTabSz="914400" rtl="0" eaLnBrk="1" fontAlgn="auto" latinLnBrk="0" hangingPunct="1">
-              <a:lnSpc>
-                <a:spcPct val="100000"/>
-              </a:lnSpc>
-              <a:spcBef>
-                <a:spcPts val="0"/>
-              </a:spcBef>
-              <a:spcAft>
-                <a:spcPts val="0"/>
-              </a:spcAft>
-              <a:buClrTx/>
-              <a:buSzTx/>
-              <a:buFontTx/>
-              <a:buNone/>
-              <a:tabLst/>
-              <a:defRPr/>
-            </a:pPr>
-            <a:endParaRPr kumimoji="0" lang="en-US" sz="1800" b="0" i="0" u="none" strike="noStrike" kern="1200" cap="none" spc="0" normalizeH="0" baseline="0" noProof="0" dirty="0">
-              <a:ln>
-                <a:noFill/>
-              </a:ln>
-              <a:solidFill>
-                <a:prstClr val="white"/>
-              </a:solidFill>
-              <a:effectLst/>
-              <a:uLnTx/>
-              <a:uFillTx/>
-              <a:latin typeface="Calibri" panose="020F0502020204030204"/>
-              <a:ea typeface="+mn-ea"/>
-              <a:cs typeface="+mn-cs"/>
-            </a:endParaRPr>
+            <a:pPr algn="ctr"/>
+            <a:endParaRPr lang="en-US" dirty="0"/>
           </a:p>
         </p:txBody>
       </p:sp>
@@ -11852,37 +11648,8 @@
           </a:bodyPr>
           <a:lstStyle/>
           <a:p>
-            <a:pPr marL="0" marR="0" lvl="0" indent="0" algn="ctr" defTabSz="914400" rtl="0" eaLnBrk="1" fontAlgn="auto" latinLnBrk="0" hangingPunct="1">
-              <a:lnSpc>
-                <a:spcPct val="100000"/>
-              </a:lnSpc>
-              <a:spcBef>
-                <a:spcPts val="0"/>
-              </a:spcBef>
-              <a:spcAft>
-                <a:spcPts val="0"/>
-              </a:spcAft>
-              <a:buClrTx/>
-              <a:buSzTx/>
-              <a:buFontTx/>
-              <a:buNone/>
-              <a:tabLst/>
-              <a:defRPr/>
-            </a:pPr>
-            <a:endParaRPr kumimoji="0" lang="en-US" sz="1800" b="0" i="0" u="none" strike="noStrike" kern="1200" cap="none" spc="0" normalizeH="0" baseline="0" noProof="0" dirty="0">
-              <a:ln>
-                <a:noFill/>
-              </a:ln>
-              <a:solidFill>
-                <a:prstClr val="white"/>
-              </a:solidFill>
-              <a:effectLst/>
-              <a:uLnTx/>
-              <a:uFillTx/>
-              <a:latin typeface="Calibri" panose="020F0502020204030204"/>
-              <a:ea typeface="+mn-ea"/>
-              <a:cs typeface="+mn-cs"/>
-            </a:endParaRPr>
+            <a:pPr algn="ctr"/>
+            <a:endParaRPr lang="en-US" dirty="0"/>
           </a:p>
         </p:txBody>
       </p:sp>
@@ -11958,37 +11725,8 @@
           <a:bodyPr rtlCol="0" anchor="ctr"/>
           <a:lstStyle/>
           <a:p>
-            <a:pPr marL="0" marR="0" lvl="0" indent="0" algn="ctr" defTabSz="914400" rtl="0" eaLnBrk="1" fontAlgn="auto" latinLnBrk="0" hangingPunct="1">
-              <a:lnSpc>
-                <a:spcPct val="100000"/>
-              </a:lnSpc>
-              <a:spcBef>
-                <a:spcPts val="0"/>
-              </a:spcBef>
-              <a:spcAft>
-                <a:spcPts val="0"/>
-              </a:spcAft>
-              <a:buClrTx/>
-              <a:buSzTx/>
-              <a:buFontTx/>
-              <a:buNone/>
-              <a:tabLst/>
-              <a:defRPr/>
-            </a:pPr>
-            <a:endParaRPr kumimoji="0" lang="en-US" sz="1800" b="0" i="0" u="none" strike="noStrike" kern="1200" cap="none" spc="0" normalizeH="0" baseline="0" noProof="0">
-              <a:ln>
-                <a:noFill/>
-              </a:ln>
-              <a:solidFill>
-                <a:prstClr val="white"/>
-              </a:solidFill>
-              <a:effectLst/>
-              <a:uLnTx/>
-              <a:uFillTx/>
-              <a:latin typeface="Calibri" panose="020F0502020204030204"/>
-              <a:ea typeface="+mn-ea"/>
-              <a:cs typeface="+mn-cs"/>
-            </a:endParaRPr>
+            <a:pPr algn="ctr"/>
+            <a:endParaRPr lang="en-US"/>
           </a:p>
         </p:txBody>
       </p:sp>
@@ -12027,17 +11765,17 @@
                   <a:srgbClr val="FFFFFF"/>
                 </a:solidFill>
               </a:rPr>
-              <a:t>Sezione contenuti</a:t>
+              <a:t>Menù navigazione</a:t>
             </a:r>
           </a:p>
         </p:txBody>
       </p:sp>
       <p:pic>
         <p:nvPicPr>
-          <p:cNvPr id="4" name="Immagine 3" descr="Immagine che contiene testo, mucca, mammifero, bovino&#10;&#10;Descrizione generata automaticamente">
-            <a:extLst>
-              <a:ext uri="{FF2B5EF4-FFF2-40B4-BE49-F238E27FC236}">
-                <a16:creationId xmlns:a16="http://schemas.microsoft.com/office/drawing/2014/main" id="{E2F96E59-5260-45C7-8E67-D91AF71EA6C6}"/>
+          <p:cNvPr id="11" name="Immagine 10" descr="Immagine che contiene testo&#10;&#10;Descrizione generata automaticamente">
+            <a:extLst>
+              <a:ext uri="{FF2B5EF4-FFF2-40B4-BE49-F238E27FC236}">
+                <a16:creationId xmlns:a16="http://schemas.microsoft.com/office/drawing/2014/main" id="{1BFB8B2A-F40E-41C0-8B5B-70BB689E76D4}"/>
               </a:ext>
             </a:extLst>
           </p:cNvPr>
@@ -12060,48 +11798,54 @@
         </p:blipFill>
         <p:spPr>
           <a:xfrm>
-            <a:off x="4990649" y="1745123"/>
-            <a:ext cx="6734629" cy="2628148"/>
+            <a:off x="8827345" y="2298329"/>
+            <a:ext cx="2448267" cy="2057687"/>
           </a:xfrm>
           <a:prstGeom prst="rect">
             <a:avLst/>
           </a:prstGeom>
-          <a:solidFill>
-            <a:srgbClr val="FFFFFF">
-              <a:shade val="85000"/>
-            </a:srgbClr>
-          </a:solidFill>
-          <a:ln w="88900" cap="sq">
-            <a:solidFill>
-              <a:srgbClr val="FFFFFF"/>
-            </a:solidFill>
-            <a:miter lim="800000"/>
-          </a:ln>
-          <a:effectLst>
-            <a:outerShdw blurRad="55000" dist="18000" dir="5400000" algn="tl" rotWithShape="0">
-              <a:srgbClr val="000000">
-                <a:alpha val="40000"/>
-              </a:srgbClr>
-            </a:outerShdw>
-          </a:effectLst>
-          <a:scene3d>
-            <a:camera prst="orthographicFront"/>
-            <a:lightRig rig="twoPt" dir="t">
-              <a:rot lat="0" lon="0" rev="7200000"/>
-            </a:lightRig>
-          </a:scene3d>
-          <a:sp3d>
-            <a:bevelT w="25400" h="19050"/>
-            <a:contourClr>
-              <a:srgbClr val="FFFFFF"/>
-            </a:contourClr>
-          </a:sp3d>
+        </p:spPr>
+      </p:pic>
+      <p:pic>
+        <p:nvPicPr>
+          <p:cNvPr id="15" name="Immagine 14" descr="Immagine che contiene testo&#10;&#10;Descrizione generata automaticamente">
+            <a:extLst>
+              <a:ext uri="{FF2B5EF4-FFF2-40B4-BE49-F238E27FC236}">
+                <a16:creationId xmlns:a16="http://schemas.microsoft.com/office/drawing/2014/main" id="{EAF874ED-D329-4909-B7F1-5A7BEE1EC4A2}"/>
+              </a:ext>
+            </a:extLst>
+          </p:cNvPr>
+          <p:cNvPicPr>
+            <a:picLocks noChangeAspect="1"/>
+          </p:cNvPicPr>
+          <p:nvPr/>
+        </p:nvPicPr>
+        <p:blipFill>
+          <a:blip r:embed="rId3">
+            <a:extLst>
+              <a:ext uri="{28A0092B-C50C-407E-A947-70E740481C1C}">
+                <a14:useLocalDpi xmlns:a14="http://schemas.microsoft.com/office/drawing/2010/main" val="0"/>
+              </a:ext>
+            </a:extLst>
+          </a:blip>
+          <a:stretch>
+            <a:fillRect/>
+          </a:stretch>
+        </p:blipFill>
+        <p:spPr>
+          <a:xfrm>
+            <a:off x="4613052" y="718758"/>
+            <a:ext cx="3639058" cy="5420481"/>
+          </a:xfrm>
+          <a:prstGeom prst="rect">
+            <a:avLst/>
+          </a:prstGeom>
         </p:spPr>
       </p:pic>
     </p:spTree>
     <p:extLst>
       <p:ext uri="{BB962C8B-B14F-4D97-AF65-F5344CB8AC3E}">
-        <p14:creationId xmlns:p14="http://schemas.microsoft.com/office/powerpoint/2010/main" val="1835678312"/>
+        <p14:creationId xmlns:p14="http://schemas.microsoft.com/office/powerpoint/2010/main" val="1847432081"/>
       </p:ext>
     </p:extLst>
   </p:cSld>
@@ -12111,7 +11855,7 @@
 </p:sld>
 </file>
 
-<file path=ppt/slides/slide9.xml><?xml version="1.0" encoding="utf-8"?>
+<file path=ppt/slides/slide8.xml><?xml version="1.0" encoding="utf-8"?>
 <p:sld xmlns:a="http://schemas.openxmlformats.org/drawingml/2006/main" xmlns:r="http://schemas.openxmlformats.org/officeDocument/2006/relationships" xmlns:p="http://schemas.openxmlformats.org/presentationml/2006/main">
   <p:cSld>
     <p:bg>
@@ -13003,10 +12747,10 @@
       </p:sp>
       <p:pic>
         <p:nvPicPr>
-          <p:cNvPr id="11" name="Immagine 10" descr="Immagine che contiene testo&#10;&#10;Descrizione generata automaticamente">
-            <a:extLst>
-              <a:ext uri="{FF2B5EF4-FFF2-40B4-BE49-F238E27FC236}">
-                <a16:creationId xmlns:a16="http://schemas.microsoft.com/office/drawing/2014/main" id="{A34E79B4-725F-4F45-949F-B67BE02CA9C8}"/>
+          <p:cNvPr id="7" name="Immagine 6">
+            <a:extLst>
+              <a:ext uri="{FF2B5EF4-FFF2-40B4-BE49-F238E27FC236}">
+                <a16:creationId xmlns:a16="http://schemas.microsoft.com/office/drawing/2014/main" id="{915692DD-2A53-4977-AD00-5919370BC5B6}"/>
               </a:ext>
             </a:extLst>
           </p:cNvPr>
@@ -13029,20 +12773,50 @@
         </p:blipFill>
         <p:spPr>
           <a:xfrm>
-            <a:off x="4134810" y="305953"/>
-            <a:ext cx="4673592" cy="3949300"/>
+            <a:off x="5240185" y="404033"/>
+            <a:ext cx="5827966" cy="2603618"/>
           </a:xfrm>
           <a:prstGeom prst="rect">
             <a:avLst/>
           </a:prstGeom>
+          <a:solidFill>
+            <a:srgbClr val="FFFFFF">
+              <a:shade val="85000"/>
+            </a:srgbClr>
+          </a:solidFill>
+          <a:ln w="88900" cap="sq">
+            <a:solidFill>
+              <a:srgbClr val="FFFFFF"/>
+            </a:solidFill>
+            <a:miter lim="800000"/>
+          </a:ln>
+          <a:effectLst>
+            <a:outerShdw blurRad="55000" dist="18000" dir="5400000" algn="tl" rotWithShape="0">
+              <a:srgbClr val="000000">
+                <a:alpha val="40000"/>
+              </a:srgbClr>
+            </a:outerShdw>
+          </a:effectLst>
+          <a:scene3d>
+            <a:camera prst="orthographicFront"/>
+            <a:lightRig rig="twoPt" dir="t">
+              <a:rot lat="0" lon="0" rev="7200000"/>
+            </a:lightRig>
+          </a:scene3d>
+          <a:sp3d>
+            <a:bevelT w="25400" h="19050"/>
+            <a:contourClr>
+              <a:srgbClr val="FFFFFF"/>
+            </a:contourClr>
+          </a:sp3d>
         </p:spPr>
       </p:pic>
       <p:pic>
         <p:nvPicPr>
-          <p:cNvPr id="5" name="Immagine 4" descr="Immagine che contiene testo&#10;&#10;Descrizione generata automaticamente">
-            <a:extLst>
-              <a:ext uri="{FF2B5EF4-FFF2-40B4-BE49-F238E27FC236}">
-                <a16:creationId xmlns:a16="http://schemas.microsoft.com/office/drawing/2014/main" id="{05138AD6-BED4-409D-AD7F-7676AB2A0AF2}"/>
+          <p:cNvPr id="11" name="Immagine 10">
+            <a:extLst>
+              <a:ext uri="{FF2B5EF4-FFF2-40B4-BE49-F238E27FC236}">
+                <a16:creationId xmlns:a16="http://schemas.microsoft.com/office/drawing/2014/main" id="{BF82D4F2-A62A-48D7-AEC5-D680EB630226}"/>
               </a:ext>
             </a:extLst>
           </p:cNvPr>
@@ -13065,20 +12839,953 @@
         </p:blipFill>
         <p:spPr>
           <a:xfrm>
-            <a:off x="8808402" y="305953"/>
-            <a:ext cx="3412208" cy="5630613"/>
+            <a:off x="5240185" y="3574733"/>
+            <a:ext cx="5827966" cy="2609859"/>
           </a:xfrm>
           <a:prstGeom prst="rect">
             <a:avLst/>
           </a:prstGeom>
+          <a:solidFill>
+            <a:srgbClr val="FFFFFF">
+              <a:shade val="85000"/>
+            </a:srgbClr>
+          </a:solidFill>
+          <a:ln w="88900" cap="sq">
+            <a:solidFill>
+              <a:srgbClr val="FFFFFF"/>
+            </a:solidFill>
+            <a:miter lim="800000"/>
+          </a:ln>
+          <a:effectLst>
+            <a:outerShdw blurRad="55000" dist="18000" dir="5400000" algn="tl" rotWithShape="0">
+              <a:srgbClr val="000000">
+                <a:alpha val="40000"/>
+              </a:srgbClr>
+            </a:outerShdw>
+          </a:effectLst>
+          <a:scene3d>
+            <a:camera prst="orthographicFront"/>
+            <a:lightRig rig="twoPt" dir="t">
+              <a:rot lat="0" lon="0" rev="7200000"/>
+            </a:lightRig>
+          </a:scene3d>
+          <a:sp3d>
+            <a:bevelT w="25400" h="19050"/>
+            <a:contourClr>
+              <a:srgbClr val="FFFFFF"/>
+            </a:contourClr>
+          </a:sp3d>
         </p:spPr>
       </p:pic>
+    </p:spTree>
+    <p:extLst>
+      <p:ext uri="{BB962C8B-B14F-4D97-AF65-F5344CB8AC3E}">
+        <p14:creationId xmlns:p14="http://schemas.microsoft.com/office/powerpoint/2010/main" val="994131774"/>
+      </p:ext>
+    </p:extLst>
+  </p:cSld>
+  <p:clrMapOvr>
+    <a:masterClrMapping/>
+  </p:clrMapOvr>
+</p:sld>
+</file>
+
+<file path=ppt/slides/slide9.xml><?xml version="1.0" encoding="utf-8"?>
+<p:sld xmlns:a="http://schemas.openxmlformats.org/drawingml/2006/main" xmlns:r="http://schemas.openxmlformats.org/officeDocument/2006/relationships" xmlns:p="http://schemas.openxmlformats.org/presentationml/2006/main">
+  <p:cSld>
+    <p:bg>
+      <p:bgPr>
+        <a:solidFill>
+          <a:schemeClr val="bg1"/>
+        </a:solidFill>
+        <a:effectLst/>
+      </p:bgPr>
+    </p:bg>
+    <p:spTree>
+      <p:nvGrpSpPr>
+        <p:cNvPr id="1" name=""/>
+        <p:cNvGrpSpPr/>
+        <p:nvPr/>
+      </p:nvGrpSpPr>
+      <p:grpSpPr>
+        <a:xfrm>
+          <a:off x="0" y="0"/>
+          <a:ext cx="0" cy="0"/>
+          <a:chOff x="0" y="0"/>
+          <a:chExt cx="0" cy="0"/>
+        </a:xfrm>
+      </p:grpSpPr>
+      <p:sp useBgFill="1">
+        <p:nvSpPr>
+          <p:cNvPr id="8" name="Rectangle 7">
+            <a:extLst>
+              <a:ext uri="{FF2B5EF4-FFF2-40B4-BE49-F238E27FC236}">
+                <a16:creationId xmlns:a16="http://schemas.microsoft.com/office/drawing/2014/main" id="{09588DA8-065E-4F6F-8EFD-43104AB2E0CF}"/>
+              </a:ext>
+              <a:ext uri="{C183D7F6-B498-43B3-948B-1728B52AA6E4}">
+                <adec:decorative xmlns:adec="http://schemas.microsoft.com/office/drawing/2017/decorative" val="1"/>
+              </a:ext>
+            </a:extLst>
+          </p:cNvPr>
+          <p:cNvSpPr>
+            <a:spLocks noGrp="1" noRot="1" noChangeAspect="1" noMove="1" noResize="1" noEditPoints="1" noAdjustHandles="1" noChangeArrowheads="1" noChangeShapeType="1" noTextEdit="1"/>
+          </p:cNvSpPr>
+          <p:nvPr>
+            <p:extLst>
+              <p:ext uri="{386F3935-93C4-4BCD-93E2-E3B085C9AB24}">
+                <p16:designElem xmlns:p16="http://schemas.microsoft.com/office/powerpoint/2015/main" val="1"/>
+              </p:ext>
+            </p:extLst>
+          </p:nvPr>
+        </p:nvSpPr>
+        <p:spPr>
+          <a:xfrm>
+            <a:off x="0" y="0"/>
+            <a:ext cx="12192000" cy="6858000"/>
+          </a:xfrm>
+          <a:prstGeom prst="rect">
+            <a:avLst/>
+          </a:prstGeom>
+          <a:ln w="12700" cap="flat" cmpd="sng" algn="ctr">
+            <a:noFill/>
+            <a:prstDash val="solid"/>
+            <a:miter lim="800000"/>
+          </a:ln>
+          <a:effectLst/>
+          <a:extLst>
+            <a:ext uri="{91240B29-F687-4F45-9708-019B960494DF}">
+              <a14:hiddenLine xmlns:a14="http://schemas.microsoft.com/office/drawing/2010/main" w="12700" cap="flat" cmpd="sng" algn="ctr">
+                <a:solidFill>
+                  <a:schemeClr val="accent1">
+                    <a:shade val="50000"/>
+                  </a:schemeClr>
+                </a:solidFill>
+                <a:prstDash val="solid"/>
+                <a:miter lim="800000"/>
+              </a14:hiddenLine>
+            </a:ext>
+          </a:extLst>
+        </p:spPr>
+        <p:style>
+          <a:lnRef idx="2">
+            <a:schemeClr val="accent1">
+              <a:shade val="50000"/>
+            </a:schemeClr>
+          </a:lnRef>
+          <a:fillRef idx="1">
+            <a:schemeClr val="accent1"/>
+          </a:fillRef>
+          <a:effectRef idx="0">
+            <a:schemeClr val="accent1"/>
+          </a:effectRef>
+          <a:fontRef idx="minor">
+            <a:schemeClr val="lt1"/>
+          </a:fontRef>
+        </p:style>
+        <p:txBody>
+          <a:bodyPr rtlCol="0" anchor="ctr"/>
+          <a:lstStyle/>
+          <a:p>
+            <a:pPr marL="0" marR="0" lvl="0" indent="0" algn="ctr" defTabSz="914400" rtl="0" eaLnBrk="1" fontAlgn="auto" latinLnBrk="0" hangingPunct="1">
+              <a:lnSpc>
+                <a:spcPct val="100000"/>
+              </a:lnSpc>
+              <a:spcBef>
+                <a:spcPts val="0"/>
+              </a:spcBef>
+              <a:spcAft>
+                <a:spcPts val="0"/>
+              </a:spcAft>
+              <a:buClrTx/>
+              <a:buSzTx/>
+              <a:buFontTx/>
+              <a:buNone/>
+              <a:tabLst/>
+              <a:defRPr/>
+            </a:pPr>
+            <a:endParaRPr kumimoji="0" lang="en-US" sz="1800" b="0" i="0" u="none" strike="noStrike" kern="1200" cap="none" spc="0" normalizeH="0" baseline="0" noProof="0">
+              <a:ln>
+                <a:noFill/>
+              </a:ln>
+              <a:solidFill>
+                <a:prstClr val="white"/>
+              </a:solidFill>
+              <a:effectLst/>
+              <a:uLnTx/>
+              <a:uFillTx/>
+              <a:latin typeface="Calibri" panose="020F0502020204030204"/>
+              <a:ea typeface="+mn-ea"/>
+              <a:cs typeface="+mn-cs"/>
+            </a:endParaRPr>
+          </a:p>
+        </p:txBody>
+      </p:sp>
+      <p:sp useBgFill="1">
+        <p:nvSpPr>
+          <p:cNvPr id="10" name="Rectangle 9">
+            <a:extLst>
+              <a:ext uri="{FF2B5EF4-FFF2-40B4-BE49-F238E27FC236}">
+                <a16:creationId xmlns:a16="http://schemas.microsoft.com/office/drawing/2014/main" id="{C4285719-470E-454C-AF62-8323075F1F5B}"/>
+              </a:ext>
+              <a:ext uri="{C183D7F6-B498-43B3-948B-1728B52AA6E4}">
+                <adec:decorative xmlns:adec="http://schemas.microsoft.com/office/drawing/2017/decorative" val="1"/>
+              </a:ext>
+            </a:extLst>
+          </p:cNvPr>
+          <p:cNvSpPr>
+            <a:spLocks noGrp="1" noRot="1" noChangeAspect="1" noMove="1" noResize="1" noEditPoints="1" noAdjustHandles="1" noChangeArrowheads="1" noChangeShapeType="1" noTextEdit="1"/>
+          </p:cNvSpPr>
+          <p:nvPr>
+            <p:extLst>
+              <p:ext uri="{386F3935-93C4-4BCD-93E2-E3B085C9AB24}">
+                <p16:designElem xmlns:p16="http://schemas.microsoft.com/office/powerpoint/2015/main" val="1"/>
+              </p:ext>
+            </p:extLst>
+          </p:nvPr>
+        </p:nvSpPr>
+        <p:spPr>
+          <a:xfrm>
+            <a:off x="0" y="0"/>
+            <a:ext cx="12188952" cy="6858000"/>
+          </a:xfrm>
+          <a:prstGeom prst="rect">
+            <a:avLst/>
+          </a:prstGeom>
+          <a:ln w="12700" cap="flat" cmpd="sng" algn="ctr">
+            <a:noFill/>
+            <a:prstDash val="solid"/>
+            <a:miter lim="800000"/>
+          </a:ln>
+          <a:effectLst/>
+          <a:extLst>
+            <a:ext uri="{91240B29-F687-4F45-9708-019B960494DF}">
+              <a14:hiddenLine xmlns:a14="http://schemas.microsoft.com/office/drawing/2010/main" w="12700" cap="flat" cmpd="sng" algn="ctr">
+                <a:solidFill>
+                  <a:schemeClr val="accent1">
+                    <a:shade val="50000"/>
+                  </a:schemeClr>
+                </a:solidFill>
+                <a:prstDash val="solid"/>
+                <a:miter lim="800000"/>
+              </a14:hiddenLine>
+            </a:ext>
+          </a:extLst>
+        </p:spPr>
+        <p:style>
+          <a:lnRef idx="2">
+            <a:schemeClr val="accent1">
+              <a:shade val="50000"/>
+            </a:schemeClr>
+          </a:lnRef>
+          <a:fillRef idx="1">
+            <a:schemeClr val="accent1"/>
+          </a:fillRef>
+          <a:effectRef idx="0">
+            <a:schemeClr val="accent1"/>
+          </a:effectRef>
+          <a:fontRef idx="minor">
+            <a:schemeClr val="lt1"/>
+          </a:fontRef>
+        </p:style>
+        <p:txBody>
+          <a:bodyPr rtlCol="0" anchor="ctr"/>
+          <a:lstStyle/>
+          <a:p>
+            <a:pPr marL="0" marR="0" lvl="0" indent="0" algn="ctr" defTabSz="914400" rtl="0" eaLnBrk="1" fontAlgn="auto" latinLnBrk="0" hangingPunct="1">
+              <a:lnSpc>
+                <a:spcPct val="100000"/>
+              </a:lnSpc>
+              <a:spcBef>
+                <a:spcPts val="0"/>
+              </a:spcBef>
+              <a:spcAft>
+                <a:spcPts val="0"/>
+              </a:spcAft>
+              <a:buClrTx/>
+              <a:buSzTx/>
+              <a:buFontTx/>
+              <a:buNone/>
+              <a:tabLst/>
+              <a:defRPr/>
+            </a:pPr>
+            <a:endParaRPr kumimoji="0" lang="en-US" sz="1800" b="0" i="0" u="none" strike="noStrike" kern="1200" cap="none" spc="0" normalizeH="0" baseline="0" noProof="0">
+              <a:ln>
+                <a:noFill/>
+              </a:ln>
+              <a:solidFill>
+                <a:prstClr val="white"/>
+              </a:solidFill>
+              <a:effectLst/>
+              <a:uLnTx/>
+              <a:uFillTx/>
+              <a:latin typeface="Calibri" panose="020F0502020204030204"/>
+              <a:ea typeface="+mn-ea"/>
+              <a:cs typeface="+mn-cs"/>
+            </a:endParaRPr>
+          </a:p>
+        </p:txBody>
+      </p:sp>
+      <p:sp>
+        <p:nvSpPr>
+          <p:cNvPr id="12" name="Rectangle 11">
+            <a:extLst>
+              <a:ext uri="{FF2B5EF4-FFF2-40B4-BE49-F238E27FC236}">
+                <a16:creationId xmlns:a16="http://schemas.microsoft.com/office/drawing/2014/main" id="{CD9FE4EF-C4D8-49A0-B2FF-81D8DB7D8A24}"/>
+              </a:ext>
+              <a:ext uri="{C183D7F6-B498-43B3-948B-1728B52AA6E4}">
+                <adec:decorative xmlns:adec="http://schemas.microsoft.com/office/drawing/2017/decorative" val="1"/>
+              </a:ext>
+            </a:extLst>
+          </p:cNvPr>
+          <p:cNvSpPr>
+            <a:spLocks noGrp="1" noRot="1" noChangeAspect="1" noMove="1" noResize="1" noEditPoints="1" noAdjustHandles="1" noChangeArrowheads="1" noChangeShapeType="1" noTextEdit="1"/>
+          </p:cNvSpPr>
+          <p:nvPr>
+            <p:extLst>
+              <p:ext uri="{386F3935-93C4-4BCD-93E2-E3B085C9AB24}">
+                <p16:designElem xmlns:p16="http://schemas.microsoft.com/office/powerpoint/2015/main" val="1"/>
+              </p:ext>
+            </p:extLst>
+          </p:nvPr>
+        </p:nvSpPr>
+        <p:spPr>
+          <a:xfrm rot="5400000" flipH="1">
+            <a:off x="-1410084" y="1410082"/>
+            <a:ext cx="6858000" cy="4037836"/>
+          </a:xfrm>
+          <a:prstGeom prst="rect">
+            <a:avLst/>
+          </a:prstGeom>
+          <a:gradFill>
+            <a:gsLst>
+              <a:gs pos="8000">
+                <a:srgbClr val="000000"/>
+              </a:gs>
+              <a:gs pos="100000">
+                <a:schemeClr val="accent1">
+                  <a:lumMod val="75000"/>
+                </a:schemeClr>
+              </a:gs>
+            </a:gsLst>
+            <a:lin ang="3000000" scaled="0"/>
+          </a:gradFill>
+          <a:ln>
+            <a:noFill/>
+          </a:ln>
+        </p:spPr>
+        <p:style>
+          <a:lnRef idx="2">
+            <a:schemeClr val="accent1">
+              <a:shade val="50000"/>
+            </a:schemeClr>
+          </a:lnRef>
+          <a:fillRef idx="1">
+            <a:schemeClr val="accent1"/>
+          </a:fillRef>
+          <a:effectRef idx="0">
+            <a:schemeClr val="accent1"/>
+          </a:effectRef>
+          <a:fontRef idx="minor">
+            <a:schemeClr val="lt1"/>
+          </a:fontRef>
+        </p:style>
+        <p:txBody>
+          <a:bodyPr rtlCol="0" anchor="ctr"/>
+          <a:lstStyle/>
+          <a:p>
+            <a:pPr marL="0" marR="0" lvl="0" indent="0" algn="ctr" defTabSz="914400" rtl="0" eaLnBrk="1" fontAlgn="auto" latinLnBrk="0" hangingPunct="1">
+              <a:lnSpc>
+                <a:spcPct val="100000"/>
+              </a:lnSpc>
+              <a:spcBef>
+                <a:spcPts val="0"/>
+              </a:spcBef>
+              <a:spcAft>
+                <a:spcPts val="0"/>
+              </a:spcAft>
+              <a:buClrTx/>
+              <a:buSzTx/>
+              <a:buFontTx/>
+              <a:buNone/>
+              <a:tabLst/>
+              <a:defRPr/>
+            </a:pPr>
+            <a:endParaRPr kumimoji="0" lang="en-US" sz="1800" b="0" i="0" u="none" strike="noStrike" kern="1200" cap="none" spc="0" normalizeH="0" baseline="0" noProof="0">
+              <a:ln>
+                <a:noFill/>
+              </a:ln>
+              <a:solidFill>
+                <a:prstClr val="white"/>
+              </a:solidFill>
+              <a:effectLst/>
+              <a:uLnTx/>
+              <a:uFillTx/>
+              <a:latin typeface="Calibri" panose="020F0502020204030204"/>
+              <a:ea typeface="+mn-ea"/>
+              <a:cs typeface="+mn-cs"/>
+            </a:endParaRPr>
+          </a:p>
+        </p:txBody>
+      </p:sp>
+      <p:sp>
+        <p:nvSpPr>
+          <p:cNvPr id="14" name="Rectangle 13">
+            <a:extLst>
+              <a:ext uri="{FF2B5EF4-FFF2-40B4-BE49-F238E27FC236}">
+                <a16:creationId xmlns:a16="http://schemas.microsoft.com/office/drawing/2014/main" id="{4300840D-0A0B-4512-BACA-B439D5B9C57C}"/>
+              </a:ext>
+              <a:ext uri="{C183D7F6-B498-43B3-948B-1728B52AA6E4}">
+                <adec:decorative xmlns:adec="http://schemas.microsoft.com/office/drawing/2017/decorative" val="1"/>
+              </a:ext>
+            </a:extLst>
+          </p:cNvPr>
+          <p:cNvSpPr>
+            <a:spLocks noGrp="1" noRot="1" noChangeAspect="1" noMove="1" noResize="1" noEditPoints="1" noAdjustHandles="1" noChangeArrowheads="1" noChangeShapeType="1" noTextEdit="1"/>
+          </p:cNvSpPr>
+          <p:nvPr>
+            <p:extLst>
+              <p:ext uri="{386F3935-93C4-4BCD-93E2-E3B085C9AB24}">
+                <p16:designElem xmlns:p16="http://schemas.microsoft.com/office/powerpoint/2015/main" val="1"/>
+              </p:ext>
+            </p:extLst>
+          </p:nvPr>
+        </p:nvSpPr>
+        <p:spPr>
+          <a:xfrm rot="5400000" flipH="1">
+            <a:off x="-1410085" y="1420219"/>
+            <a:ext cx="6857999" cy="4037839"/>
+          </a:xfrm>
+          <a:prstGeom prst="rect">
+            <a:avLst/>
+          </a:prstGeom>
+          <a:gradFill>
+            <a:gsLst>
+              <a:gs pos="0">
+                <a:srgbClr val="000000">
+                  <a:alpha val="0"/>
+                </a:srgbClr>
+              </a:gs>
+              <a:gs pos="99000">
+                <a:schemeClr val="accent1">
+                  <a:alpha val="46000"/>
+                </a:schemeClr>
+              </a:gs>
+            </a:gsLst>
+            <a:lin ang="1800000" scaled="0"/>
+          </a:gradFill>
+          <a:ln>
+            <a:noFill/>
+          </a:ln>
+        </p:spPr>
+        <p:style>
+          <a:lnRef idx="2">
+            <a:schemeClr val="accent1">
+              <a:shade val="50000"/>
+            </a:schemeClr>
+          </a:lnRef>
+          <a:fillRef idx="1">
+            <a:schemeClr val="accent1"/>
+          </a:fillRef>
+          <a:effectRef idx="0">
+            <a:schemeClr val="accent1"/>
+          </a:effectRef>
+          <a:fontRef idx="minor">
+            <a:schemeClr val="lt1"/>
+          </a:fontRef>
+        </p:style>
+        <p:txBody>
+          <a:bodyPr rtlCol="0" anchor="ctr"/>
+          <a:lstStyle/>
+          <a:p>
+            <a:pPr marL="0" marR="0" lvl="0" indent="0" algn="ctr" defTabSz="914400" rtl="0" eaLnBrk="1" fontAlgn="auto" latinLnBrk="0" hangingPunct="1">
+              <a:lnSpc>
+                <a:spcPct val="100000"/>
+              </a:lnSpc>
+              <a:spcBef>
+                <a:spcPts val="0"/>
+              </a:spcBef>
+              <a:spcAft>
+                <a:spcPts val="0"/>
+              </a:spcAft>
+              <a:buClrTx/>
+              <a:buSzTx/>
+              <a:buFontTx/>
+              <a:buNone/>
+              <a:tabLst/>
+              <a:defRPr/>
+            </a:pPr>
+            <a:endParaRPr kumimoji="0" lang="en-US" sz="1800" b="0" i="0" u="none" strike="noStrike" kern="1200" cap="none" spc="0" normalizeH="0" baseline="0" noProof="0">
+              <a:ln>
+                <a:noFill/>
+              </a:ln>
+              <a:solidFill>
+                <a:prstClr val="white"/>
+              </a:solidFill>
+              <a:effectLst/>
+              <a:uLnTx/>
+              <a:uFillTx/>
+              <a:latin typeface="Calibri" panose="020F0502020204030204"/>
+              <a:ea typeface="+mn-ea"/>
+              <a:cs typeface="+mn-cs"/>
+            </a:endParaRPr>
+          </a:p>
+        </p:txBody>
+      </p:sp>
+      <p:sp>
+        <p:nvSpPr>
+          <p:cNvPr id="16" name="Rectangle 15">
+            <a:extLst>
+              <a:ext uri="{FF2B5EF4-FFF2-40B4-BE49-F238E27FC236}">
+                <a16:creationId xmlns:a16="http://schemas.microsoft.com/office/drawing/2014/main" id="{D2B78728-A580-49A7-84F9-6EF6F583ADE0}"/>
+              </a:ext>
+              <a:ext uri="{C183D7F6-B498-43B3-948B-1728B52AA6E4}">
+                <adec:decorative xmlns:adec="http://schemas.microsoft.com/office/drawing/2017/decorative" val="1"/>
+              </a:ext>
+            </a:extLst>
+          </p:cNvPr>
+          <p:cNvSpPr>
+            <a:spLocks noGrp="1" noRot="1" noChangeAspect="1" noMove="1" noResize="1" noEditPoints="1" noAdjustHandles="1" noChangeArrowheads="1" noChangeShapeType="1" noTextEdit="1"/>
+          </p:cNvSpPr>
+          <p:nvPr>
+            <p:extLst>
+              <p:ext uri="{386F3935-93C4-4BCD-93E2-E3B085C9AB24}">
+                <p16:designElem xmlns:p16="http://schemas.microsoft.com/office/powerpoint/2015/main" val="1"/>
+              </p:ext>
+            </p:extLst>
+          </p:nvPr>
+        </p:nvSpPr>
+        <p:spPr>
+          <a:xfrm rot="5400000" flipH="1">
+            <a:off x="767923" y="3588085"/>
+            <a:ext cx="2501979" cy="4037841"/>
+          </a:xfrm>
+          <a:prstGeom prst="rect">
+            <a:avLst/>
+          </a:prstGeom>
+          <a:gradFill>
+            <a:gsLst>
+              <a:gs pos="2000">
+                <a:schemeClr val="accent1">
+                  <a:alpha val="29000"/>
+                </a:schemeClr>
+              </a:gs>
+              <a:gs pos="100000">
+                <a:srgbClr val="000000">
+                  <a:alpha val="30000"/>
+                </a:srgbClr>
+              </a:gs>
+            </a:gsLst>
+            <a:lin ang="7800000" scaled="0"/>
+          </a:gradFill>
+          <a:ln>
+            <a:noFill/>
+          </a:ln>
+        </p:spPr>
+        <p:style>
+          <a:lnRef idx="2">
+            <a:schemeClr val="accent1">
+              <a:shade val="50000"/>
+            </a:schemeClr>
+          </a:lnRef>
+          <a:fillRef idx="1">
+            <a:schemeClr val="accent1"/>
+          </a:fillRef>
+          <a:effectRef idx="0">
+            <a:schemeClr val="accent1"/>
+          </a:effectRef>
+          <a:fontRef idx="minor">
+            <a:schemeClr val="lt1"/>
+          </a:fontRef>
+        </p:style>
+        <p:txBody>
+          <a:bodyPr rtlCol="0" anchor="ctr"/>
+          <a:lstStyle/>
+          <a:p>
+            <a:pPr marL="0" marR="0" lvl="0" indent="0" algn="ctr" defTabSz="914400" rtl="0" eaLnBrk="1" fontAlgn="auto" latinLnBrk="0" hangingPunct="1">
+              <a:lnSpc>
+                <a:spcPct val="100000"/>
+              </a:lnSpc>
+              <a:spcBef>
+                <a:spcPts val="0"/>
+              </a:spcBef>
+              <a:spcAft>
+                <a:spcPts val="0"/>
+              </a:spcAft>
+              <a:buClrTx/>
+              <a:buSzTx/>
+              <a:buFontTx/>
+              <a:buNone/>
+              <a:tabLst/>
+              <a:defRPr/>
+            </a:pPr>
+            <a:endParaRPr kumimoji="0" lang="en-US" sz="1800" b="0" i="0" u="none" strike="noStrike" kern="1200" cap="none" spc="0" normalizeH="0" baseline="0" noProof="0" dirty="0">
+              <a:ln>
+                <a:noFill/>
+              </a:ln>
+              <a:solidFill>
+                <a:prstClr val="white"/>
+              </a:solidFill>
+              <a:effectLst/>
+              <a:uLnTx/>
+              <a:uFillTx/>
+              <a:latin typeface="Calibri" panose="020F0502020204030204"/>
+              <a:ea typeface="+mn-ea"/>
+              <a:cs typeface="+mn-cs"/>
+            </a:endParaRPr>
+          </a:p>
+        </p:txBody>
+      </p:sp>
+      <p:sp>
+        <p:nvSpPr>
+          <p:cNvPr id="18" name="Freeform: Shape 17">
+            <a:extLst>
+              <a:ext uri="{FF2B5EF4-FFF2-40B4-BE49-F238E27FC236}">
+                <a16:creationId xmlns:a16="http://schemas.microsoft.com/office/drawing/2014/main" id="{38FAA1A1-D861-433F-88FA-1E9D6FD31D11}"/>
+              </a:ext>
+              <a:ext uri="{C183D7F6-B498-43B3-948B-1728B52AA6E4}">
+                <adec:decorative xmlns:adec="http://schemas.microsoft.com/office/drawing/2017/decorative" val="1"/>
+              </a:ext>
+            </a:extLst>
+          </p:cNvPr>
+          <p:cNvSpPr>
+            <a:spLocks noGrp="1" noRot="1" noChangeAspect="1" noMove="1" noResize="1" noEditPoints="1" noAdjustHandles="1" noChangeArrowheads="1" noChangeShapeType="1" noTextEdit="1"/>
+          </p:cNvSpPr>
+          <p:nvPr>
+            <p:extLst>
+              <p:ext uri="{386F3935-93C4-4BCD-93E2-E3B085C9AB24}">
+                <p16:designElem xmlns:p16="http://schemas.microsoft.com/office/powerpoint/2015/main" val="1"/>
+              </p:ext>
+            </p:extLst>
+          </p:nvPr>
+        </p:nvSpPr>
+        <p:spPr>
+          <a:xfrm rot="20635413">
+            <a:off x="-501737" y="969718"/>
+            <a:ext cx="3900357" cy="4178958"/>
+          </a:xfrm>
+          <a:custGeom>
+            <a:avLst/>
+            <a:gdLst>
+              <a:gd name="connsiteX0" fmla="*/ 2432225 w 3900357"/>
+              <a:gd name="connsiteY0" fmla="*/ 93939 h 4178958"/>
+              <a:gd name="connsiteX1" fmla="*/ 3900357 w 3900357"/>
+              <a:gd name="connsiteY1" fmla="*/ 2089479 h 4178958"/>
+              <a:gd name="connsiteX2" fmla="*/ 1810878 w 3900357"/>
+              <a:gd name="connsiteY2" fmla="*/ 4178958 h 4178958"/>
+              <a:gd name="connsiteX3" fmla="*/ 78249 w 3900357"/>
+              <a:gd name="connsiteY3" fmla="*/ 3257727 h 4178958"/>
+              <a:gd name="connsiteX4" fmla="*/ 0 w 3900357"/>
+              <a:gd name="connsiteY4" fmla="*/ 3128923 h 4178958"/>
+              <a:gd name="connsiteX5" fmla="*/ 831324 w 3900357"/>
+              <a:gd name="connsiteY5" fmla="*/ 244281 h 4178958"/>
+              <a:gd name="connsiteX6" fmla="*/ 997559 w 3900357"/>
+              <a:gd name="connsiteY6" fmla="*/ 164202 h 4178958"/>
+              <a:gd name="connsiteX7" fmla="*/ 1810878 w 3900357"/>
+              <a:gd name="connsiteY7" fmla="*/ 0 h 4178958"/>
+              <a:gd name="connsiteX8" fmla="*/ 2432225 w 3900357"/>
+              <a:gd name="connsiteY8" fmla="*/ 93939 h 4178958"/>
+            </a:gdLst>
+            <a:ahLst/>
+            <a:cxnLst>
+              <a:cxn ang="0">
+                <a:pos x="connsiteX0" y="connsiteY0"/>
+              </a:cxn>
+              <a:cxn ang="0">
+                <a:pos x="connsiteX1" y="connsiteY1"/>
+              </a:cxn>
+              <a:cxn ang="0">
+                <a:pos x="connsiteX2" y="connsiteY2"/>
+              </a:cxn>
+              <a:cxn ang="0">
+                <a:pos x="connsiteX3" y="connsiteY3"/>
+              </a:cxn>
+              <a:cxn ang="0">
+                <a:pos x="connsiteX4" y="connsiteY4"/>
+              </a:cxn>
+              <a:cxn ang="0">
+                <a:pos x="connsiteX5" y="connsiteY5"/>
+              </a:cxn>
+              <a:cxn ang="0">
+                <a:pos x="connsiteX6" y="connsiteY6"/>
+              </a:cxn>
+              <a:cxn ang="0">
+                <a:pos x="connsiteX7" y="connsiteY7"/>
+              </a:cxn>
+              <a:cxn ang="0">
+                <a:pos x="connsiteX8" y="connsiteY8"/>
+              </a:cxn>
+            </a:cxnLst>
+            <a:rect l="l" t="t" r="r" b="b"/>
+            <a:pathLst>
+              <a:path w="3900357" h="4178958">
+                <a:moveTo>
+                  <a:pt x="2432225" y="93939"/>
+                </a:moveTo>
+                <a:cubicBezTo>
+                  <a:pt x="3282786" y="358491"/>
+                  <a:pt x="3900357" y="1151865"/>
+                  <a:pt x="3900357" y="2089479"/>
+                </a:cubicBezTo>
+                <a:cubicBezTo>
+                  <a:pt x="3900357" y="3243466"/>
+                  <a:pt x="2964865" y="4178958"/>
+                  <a:pt x="1810878" y="4178958"/>
+                </a:cubicBezTo>
+                <a:cubicBezTo>
+                  <a:pt x="1089636" y="4178958"/>
+                  <a:pt x="453744" y="3813531"/>
+                  <a:pt x="78249" y="3257727"/>
+                </a:cubicBezTo>
+                <a:lnTo>
+                  <a:pt x="0" y="3128923"/>
+                </a:lnTo>
+                <a:lnTo>
+                  <a:pt x="831324" y="244281"/>
+                </a:lnTo>
+                <a:lnTo>
+                  <a:pt x="997559" y="164202"/>
+                </a:lnTo>
+                <a:cubicBezTo>
+                  <a:pt x="1247540" y="58468"/>
+                  <a:pt x="1522381" y="0"/>
+                  <a:pt x="1810878" y="0"/>
+                </a:cubicBezTo>
+                <a:cubicBezTo>
+                  <a:pt x="2027251" y="0"/>
+                  <a:pt x="2235942" y="32888"/>
+                  <a:pt x="2432225" y="93939"/>
+                </a:cubicBezTo>
+                <a:close/>
+              </a:path>
+            </a:pathLst>
+          </a:custGeom>
+          <a:gradFill>
+            <a:gsLst>
+              <a:gs pos="29000">
+                <a:srgbClr val="000000">
+                  <a:alpha val="0"/>
+                </a:srgbClr>
+              </a:gs>
+              <a:gs pos="100000">
+                <a:schemeClr val="accent1">
+                  <a:alpha val="43000"/>
+                </a:schemeClr>
+              </a:gs>
+            </a:gsLst>
+            <a:lin ang="1800000" scaled="0"/>
+          </a:gradFill>
+          <a:ln>
+            <a:noFill/>
+          </a:ln>
+        </p:spPr>
+        <p:style>
+          <a:lnRef idx="2">
+            <a:schemeClr val="accent1">
+              <a:shade val="50000"/>
+            </a:schemeClr>
+          </a:lnRef>
+          <a:fillRef idx="1">
+            <a:schemeClr val="accent1"/>
+          </a:fillRef>
+          <a:effectRef idx="0">
+            <a:schemeClr val="accent1"/>
+          </a:effectRef>
+          <a:fontRef idx="minor">
+            <a:schemeClr val="lt1"/>
+          </a:fontRef>
+        </p:style>
+        <p:txBody>
+          <a:bodyPr wrap="square" rtlCol="0" anchor="ctr">
+            <a:noAutofit/>
+          </a:bodyPr>
+          <a:lstStyle/>
+          <a:p>
+            <a:pPr marL="0" marR="0" lvl="0" indent="0" algn="ctr" defTabSz="914400" rtl="0" eaLnBrk="1" fontAlgn="auto" latinLnBrk="0" hangingPunct="1">
+              <a:lnSpc>
+                <a:spcPct val="100000"/>
+              </a:lnSpc>
+              <a:spcBef>
+                <a:spcPts val="0"/>
+              </a:spcBef>
+              <a:spcAft>
+                <a:spcPts val="0"/>
+              </a:spcAft>
+              <a:buClrTx/>
+              <a:buSzTx/>
+              <a:buFontTx/>
+              <a:buNone/>
+              <a:tabLst/>
+              <a:defRPr/>
+            </a:pPr>
+            <a:endParaRPr kumimoji="0" lang="en-US" sz="1800" b="0" i="0" u="none" strike="noStrike" kern="1200" cap="none" spc="0" normalizeH="0" baseline="0" noProof="0" dirty="0">
+              <a:ln>
+                <a:noFill/>
+              </a:ln>
+              <a:solidFill>
+                <a:prstClr val="white"/>
+              </a:solidFill>
+              <a:effectLst/>
+              <a:uLnTx/>
+              <a:uFillTx/>
+              <a:latin typeface="Calibri" panose="020F0502020204030204"/>
+              <a:ea typeface="+mn-ea"/>
+              <a:cs typeface="+mn-cs"/>
+            </a:endParaRPr>
+          </a:p>
+        </p:txBody>
+      </p:sp>
+      <p:sp>
+        <p:nvSpPr>
+          <p:cNvPr id="20" name="Rectangle 19">
+            <a:extLst>
+              <a:ext uri="{FF2B5EF4-FFF2-40B4-BE49-F238E27FC236}">
+                <a16:creationId xmlns:a16="http://schemas.microsoft.com/office/drawing/2014/main" id="{8D71EDA1-87BF-4D5D-AB79-F346FD19278A}"/>
+              </a:ext>
+              <a:ext uri="{C183D7F6-B498-43B3-948B-1728B52AA6E4}">
+                <adec:decorative xmlns:adec="http://schemas.microsoft.com/office/drawing/2017/decorative" val="1"/>
+              </a:ext>
+            </a:extLst>
+          </p:cNvPr>
+          <p:cNvSpPr>
+            <a:spLocks noGrp="1" noRot="1" noChangeAspect="1" noMove="1" noResize="1" noEditPoints="1" noAdjustHandles="1" noChangeArrowheads="1" noChangeShapeType="1" noTextEdit="1"/>
+          </p:cNvSpPr>
+          <p:nvPr>
+            <p:extLst>
+              <p:ext uri="{386F3935-93C4-4BCD-93E2-E3B085C9AB24}">
+                <p16:designElem xmlns:p16="http://schemas.microsoft.com/office/powerpoint/2015/main" val="1"/>
+              </p:ext>
+            </p:extLst>
+          </p:nvPr>
+        </p:nvSpPr>
+        <p:spPr>
+          <a:xfrm rot="5400000" flipH="1">
+            <a:off x="-1410093" y="1399943"/>
+            <a:ext cx="6858003" cy="4037835"/>
+          </a:xfrm>
+          <a:prstGeom prst="rect">
+            <a:avLst/>
+          </a:prstGeom>
+          <a:gradFill>
+            <a:gsLst>
+              <a:gs pos="0">
+                <a:srgbClr val="000000">
+                  <a:alpha val="0"/>
+                </a:srgbClr>
+              </a:gs>
+              <a:gs pos="99000">
+                <a:schemeClr val="accent1">
+                  <a:lumMod val="60000"/>
+                  <a:lumOff val="40000"/>
+                  <a:alpha val="11000"/>
+                </a:schemeClr>
+              </a:gs>
+            </a:gsLst>
+            <a:lin ang="7200000" scaled="0"/>
+          </a:gradFill>
+          <a:ln>
+            <a:noFill/>
+          </a:ln>
+        </p:spPr>
+        <p:style>
+          <a:lnRef idx="2">
+            <a:schemeClr val="accent1">
+              <a:shade val="50000"/>
+            </a:schemeClr>
+          </a:lnRef>
+          <a:fillRef idx="1">
+            <a:schemeClr val="accent1"/>
+          </a:fillRef>
+          <a:effectRef idx="0">
+            <a:schemeClr val="accent1"/>
+          </a:effectRef>
+          <a:fontRef idx="minor">
+            <a:schemeClr val="lt1"/>
+          </a:fontRef>
+        </p:style>
+        <p:txBody>
+          <a:bodyPr rtlCol="0" anchor="ctr"/>
+          <a:lstStyle/>
+          <a:p>
+            <a:pPr marL="0" marR="0" lvl="0" indent="0" algn="ctr" defTabSz="914400" rtl="0" eaLnBrk="1" fontAlgn="auto" latinLnBrk="0" hangingPunct="1">
+              <a:lnSpc>
+                <a:spcPct val="100000"/>
+              </a:lnSpc>
+              <a:spcBef>
+                <a:spcPts val="0"/>
+              </a:spcBef>
+              <a:spcAft>
+                <a:spcPts val="0"/>
+              </a:spcAft>
+              <a:buClrTx/>
+              <a:buSzTx/>
+              <a:buFontTx/>
+              <a:buNone/>
+              <a:tabLst/>
+              <a:defRPr/>
+            </a:pPr>
+            <a:endParaRPr kumimoji="0" lang="en-US" sz="1800" b="0" i="0" u="none" strike="noStrike" kern="1200" cap="none" spc="0" normalizeH="0" baseline="0" noProof="0">
+              <a:ln>
+                <a:noFill/>
+              </a:ln>
+              <a:solidFill>
+                <a:prstClr val="white"/>
+              </a:solidFill>
+              <a:effectLst/>
+              <a:uLnTx/>
+              <a:uFillTx/>
+              <a:latin typeface="Calibri" panose="020F0502020204030204"/>
+              <a:ea typeface="+mn-ea"/>
+              <a:cs typeface="+mn-cs"/>
+            </a:endParaRPr>
+          </a:p>
+        </p:txBody>
+      </p:sp>
+      <p:sp>
+        <p:nvSpPr>
+          <p:cNvPr id="2" name="Title 1">
+            <a:extLst>
+              <a:ext uri="{FF2B5EF4-FFF2-40B4-BE49-F238E27FC236}">
+                <a16:creationId xmlns:a16="http://schemas.microsoft.com/office/drawing/2014/main" id="{E9FFD19F-75CA-4966-B79C-2935A271ADBD}"/>
+              </a:ext>
+            </a:extLst>
+          </p:cNvPr>
+          <p:cNvSpPr>
+            <a:spLocks noGrp="1"/>
+          </p:cNvSpPr>
+          <p:nvPr>
+            <p:ph type="title"/>
+          </p:nvPr>
+        </p:nvSpPr>
+        <p:spPr>
+          <a:xfrm>
+            <a:off x="466722" y="586855"/>
+            <a:ext cx="3201366" cy="3387497"/>
+          </a:xfrm>
+        </p:spPr>
+        <p:txBody>
+          <a:bodyPr anchor="b">
+            <a:normAutofit/>
+          </a:bodyPr>
+          <a:lstStyle/>
+          <a:p>
+            <a:pPr algn="r"/>
+            <a:r>
+              <a:rPr lang="it-IT" sz="4000" dirty="0">
+                <a:solidFill>
+                  <a:srgbClr val="FFFFFF"/>
+                </a:solidFill>
+              </a:rPr>
+              <a:t>Sezione contenuti</a:t>
+            </a:r>
+          </a:p>
+        </p:txBody>
+      </p:sp>
       <p:pic>
         <p:nvPicPr>
-          <p:cNvPr id="15" name="Immagine 14" descr="Immagine che contiene testo&#10;&#10;Descrizione generata automaticamente">
-            <a:extLst>
-              <a:ext uri="{FF2B5EF4-FFF2-40B4-BE49-F238E27FC236}">
-                <a16:creationId xmlns:a16="http://schemas.microsoft.com/office/drawing/2014/main" id="{457E9F87-0801-4543-9544-C18F158F90B2}"/>
+          <p:cNvPr id="4" name="Immagine 3" descr="Immagine che contiene testo, mucca, mammifero, bovino&#10;&#10;Descrizione generata automaticamente">
+            <a:extLst>
+              <a:ext uri="{FF2B5EF4-FFF2-40B4-BE49-F238E27FC236}">
+                <a16:creationId xmlns:a16="http://schemas.microsoft.com/office/drawing/2014/main" id="{E2F96E59-5260-45C7-8E67-D91AF71EA6C6}"/>
               </a:ext>
             </a:extLst>
           </p:cNvPr>
@@ -13088,7 +13795,7 @@
           <p:nvPr/>
         </p:nvPicPr>
         <p:blipFill>
-          <a:blip r:embed="rId4">
+          <a:blip r:embed="rId2">
             <a:extLst>
               <a:ext uri="{28A0092B-C50C-407E-A947-70E740481C1C}">
                 <a14:useLocalDpi xmlns:a14="http://schemas.microsoft.com/office/drawing/2010/main" val="0"/>
@@ -13101,18 +13808,48 @@
         </p:blipFill>
         <p:spPr>
           <a:xfrm>
-            <a:off x="4566211" y="4265395"/>
-            <a:ext cx="4145207" cy="2504143"/>
+            <a:off x="4990649" y="1745123"/>
+            <a:ext cx="6734629" cy="2628148"/>
           </a:xfrm>
           <a:prstGeom prst="rect">
             <a:avLst/>
           </a:prstGeom>
+          <a:solidFill>
+            <a:srgbClr val="FFFFFF">
+              <a:shade val="85000"/>
+            </a:srgbClr>
+          </a:solidFill>
+          <a:ln w="88900" cap="sq">
+            <a:solidFill>
+              <a:srgbClr val="FFFFFF"/>
+            </a:solidFill>
+            <a:miter lim="800000"/>
+          </a:ln>
+          <a:effectLst>
+            <a:outerShdw blurRad="55000" dist="18000" dir="5400000" algn="tl" rotWithShape="0">
+              <a:srgbClr val="000000">
+                <a:alpha val="40000"/>
+              </a:srgbClr>
+            </a:outerShdw>
+          </a:effectLst>
+          <a:scene3d>
+            <a:camera prst="orthographicFront"/>
+            <a:lightRig rig="twoPt" dir="t">
+              <a:rot lat="0" lon="0" rev="7200000"/>
+            </a:lightRig>
+          </a:scene3d>
+          <a:sp3d>
+            <a:bevelT w="25400" h="19050"/>
+            <a:contourClr>
+              <a:srgbClr val="FFFFFF"/>
+            </a:contourClr>
+          </a:sp3d>
         </p:spPr>
       </p:pic>
     </p:spTree>
     <p:extLst>
       <p:ext uri="{BB962C8B-B14F-4D97-AF65-F5344CB8AC3E}">
-        <p14:creationId xmlns:p14="http://schemas.microsoft.com/office/powerpoint/2010/main" val="90384242"/>
+        <p14:creationId xmlns:p14="http://schemas.microsoft.com/office/powerpoint/2010/main" val="1835678312"/>
       </p:ext>
     </p:extLst>
   </p:cSld>

</xml_diff>